<commit_message>
update the solver chooser; check all current sphpy
</commit_message>
<xml_diff>
--- a/data/draft.pptx
+++ b/data/draft.pptx
@@ -8,6 +8,7 @@
     <p:sldId id="257" r:id="rId2"/>
     <p:sldId id="258" r:id="rId3"/>
     <p:sldId id="259" r:id="rId4"/>
+    <p:sldId id="260" r:id="rId5"/>
   </p:sldIdLst>
   <p:sldSz cx="12192000" cy="6858000"/>
   <p:notesSz cx="6797675" cy="9926638"/>
@@ -274,7 +275,7 @@
           <a:p>
             <a:fld id="{8837BD83-C95D-452A-8A03-A9CBA33557B0}" type="datetimeFigureOut">
               <a:rPr lang="en-GB" smtClean="0"/>
-              <a:t>21/07/2022</a:t>
+              <a:t>05/08/2022</a:t>
             </a:fld>
             <a:endParaRPr lang="en-GB"/>
           </a:p>
@@ -474,7 +475,7 @@
           <a:p>
             <a:fld id="{8837BD83-C95D-452A-8A03-A9CBA33557B0}" type="datetimeFigureOut">
               <a:rPr lang="en-GB" smtClean="0"/>
-              <a:t>21/07/2022</a:t>
+              <a:t>05/08/2022</a:t>
             </a:fld>
             <a:endParaRPr lang="en-GB"/>
           </a:p>
@@ -684,7 +685,7 @@
           <a:p>
             <a:fld id="{8837BD83-C95D-452A-8A03-A9CBA33557B0}" type="datetimeFigureOut">
               <a:rPr lang="en-GB" smtClean="0"/>
-              <a:t>21/07/2022</a:t>
+              <a:t>05/08/2022</a:t>
             </a:fld>
             <a:endParaRPr lang="en-GB"/>
           </a:p>
@@ -884,7 +885,7 @@
           <a:p>
             <a:fld id="{8837BD83-C95D-452A-8A03-A9CBA33557B0}" type="datetimeFigureOut">
               <a:rPr lang="en-GB" smtClean="0"/>
-              <a:t>21/07/2022</a:t>
+              <a:t>05/08/2022</a:t>
             </a:fld>
             <a:endParaRPr lang="en-GB"/>
           </a:p>
@@ -1160,7 +1161,7 @@
           <a:p>
             <a:fld id="{8837BD83-C95D-452A-8A03-A9CBA33557B0}" type="datetimeFigureOut">
               <a:rPr lang="en-GB" smtClean="0"/>
-              <a:t>21/07/2022</a:t>
+              <a:t>05/08/2022</a:t>
             </a:fld>
             <a:endParaRPr lang="en-GB"/>
           </a:p>
@@ -1428,7 +1429,7 @@
           <a:p>
             <a:fld id="{8837BD83-C95D-452A-8A03-A9CBA33557B0}" type="datetimeFigureOut">
               <a:rPr lang="en-GB" smtClean="0"/>
-              <a:t>21/07/2022</a:t>
+              <a:t>05/08/2022</a:t>
             </a:fld>
             <a:endParaRPr lang="en-GB"/>
           </a:p>
@@ -1843,7 +1844,7 @@
           <a:p>
             <a:fld id="{8837BD83-C95D-452A-8A03-A9CBA33557B0}" type="datetimeFigureOut">
               <a:rPr lang="en-GB" smtClean="0"/>
-              <a:t>21/07/2022</a:t>
+              <a:t>05/08/2022</a:t>
             </a:fld>
             <a:endParaRPr lang="en-GB"/>
           </a:p>
@@ -1985,7 +1986,7 @@
           <a:p>
             <a:fld id="{8837BD83-C95D-452A-8A03-A9CBA33557B0}" type="datetimeFigureOut">
               <a:rPr lang="en-GB" smtClean="0"/>
-              <a:t>21/07/2022</a:t>
+              <a:t>05/08/2022</a:t>
             </a:fld>
             <a:endParaRPr lang="en-GB"/>
           </a:p>
@@ -2098,7 +2099,7 @@
           <a:p>
             <a:fld id="{8837BD83-C95D-452A-8A03-A9CBA33557B0}" type="datetimeFigureOut">
               <a:rPr lang="en-GB" smtClean="0"/>
-              <a:t>21/07/2022</a:t>
+              <a:t>05/08/2022</a:t>
             </a:fld>
             <a:endParaRPr lang="en-GB"/>
           </a:p>
@@ -2411,7 +2412,7 @@
           <a:p>
             <a:fld id="{8837BD83-C95D-452A-8A03-A9CBA33557B0}" type="datetimeFigureOut">
               <a:rPr lang="en-GB" smtClean="0"/>
-              <a:t>21/07/2022</a:t>
+              <a:t>05/08/2022</a:t>
             </a:fld>
             <a:endParaRPr lang="en-GB"/>
           </a:p>
@@ -2700,7 +2701,7 @@
           <a:p>
             <a:fld id="{8837BD83-C95D-452A-8A03-A9CBA33557B0}" type="datetimeFigureOut">
               <a:rPr lang="en-GB" smtClean="0"/>
-              <a:t>21/07/2022</a:t>
+              <a:t>05/08/2022</a:t>
             </a:fld>
             <a:endParaRPr lang="en-GB"/>
           </a:p>
@@ -2943,7 +2944,7 @@
           <a:p>
             <a:fld id="{8837BD83-C95D-452A-8A03-A9CBA33557B0}" type="datetimeFigureOut">
               <a:rPr lang="en-GB" smtClean="0"/>
-              <a:t>21/07/2022</a:t>
+              <a:t>05/08/2022</a:t>
             </a:fld>
             <a:endParaRPr lang="en-GB"/>
           </a:p>
@@ -11254,6 +11255,1788 @@
 </p:sld>
 </file>
 
+<file path=ppt/slides/slide4.xml><?xml version="1.0" encoding="utf-8"?>
+<p:sld xmlns:a="http://schemas.openxmlformats.org/drawingml/2006/main" xmlns:r="http://schemas.openxmlformats.org/officeDocument/2006/relationships" xmlns:p="http://schemas.openxmlformats.org/presentationml/2006/main">
+  <p:cSld>
+    <p:spTree>
+      <p:nvGrpSpPr>
+        <p:cNvPr id="1" name=""/>
+        <p:cNvGrpSpPr/>
+        <p:nvPr/>
+      </p:nvGrpSpPr>
+      <p:grpSpPr>
+        <a:xfrm>
+          <a:off x="0" y="0"/>
+          <a:ext cx="0" cy="0"/>
+          <a:chOff x="0" y="0"/>
+          <a:chExt cx="0" cy="0"/>
+        </a:xfrm>
+      </p:grpSpPr>
+      <p:cxnSp>
+        <p:nvCxnSpPr>
+          <p:cNvPr id="5" name="Straight Arrow Connector 4">
+            <a:extLst>
+              <a:ext uri="{FF2B5EF4-FFF2-40B4-BE49-F238E27FC236}">
+                <a16:creationId xmlns:a16="http://schemas.microsoft.com/office/drawing/2014/main" id="{25678131-EFC3-4457-9F70-BED9F66DDAE7}"/>
+              </a:ext>
+            </a:extLst>
+          </p:cNvPr>
+          <p:cNvCxnSpPr>
+            <a:cxnSpLocks/>
+          </p:cNvCxnSpPr>
+          <p:nvPr/>
+        </p:nvCxnSpPr>
+        <p:spPr>
+          <a:xfrm>
+            <a:off x="1584959" y="966643"/>
+            <a:ext cx="1465279" cy="2306431"/>
+          </a:xfrm>
+          <a:prstGeom prst="straightConnector1">
+            <a:avLst/>
+          </a:prstGeom>
+          <a:ln>
+            <a:tailEnd type="triangle"/>
+          </a:ln>
+        </p:spPr>
+        <p:style>
+          <a:lnRef idx="1">
+            <a:schemeClr val="accent1"/>
+          </a:lnRef>
+          <a:fillRef idx="0">
+            <a:schemeClr val="accent1"/>
+          </a:fillRef>
+          <a:effectRef idx="0">
+            <a:schemeClr val="accent1"/>
+          </a:effectRef>
+          <a:fontRef idx="minor">
+            <a:schemeClr val="tx1"/>
+          </a:fontRef>
+        </p:style>
+      </p:cxnSp>
+      <p:cxnSp>
+        <p:nvCxnSpPr>
+          <p:cNvPr id="7" name="Straight Arrow Connector 6">
+            <a:extLst>
+              <a:ext uri="{FF2B5EF4-FFF2-40B4-BE49-F238E27FC236}">
+                <a16:creationId xmlns:a16="http://schemas.microsoft.com/office/drawing/2014/main" id="{F2DF2B7A-94D9-4B39-9E24-A0964FC4B1DB}"/>
+              </a:ext>
+            </a:extLst>
+          </p:cNvPr>
+          <p:cNvCxnSpPr>
+            <a:cxnSpLocks/>
+          </p:cNvCxnSpPr>
+          <p:nvPr/>
+        </p:nvCxnSpPr>
+        <p:spPr>
+          <a:xfrm>
+            <a:off x="3049118" y="3273074"/>
+            <a:ext cx="3299431" cy="2013577"/>
+          </a:xfrm>
+          <a:prstGeom prst="straightConnector1">
+            <a:avLst/>
+          </a:prstGeom>
+          <a:ln>
+            <a:tailEnd type="triangle"/>
+          </a:ln>
+        </p:spPr>
+        <p:style>
+          <a:lnRef idx="1">
+            <a:schemeClr val="accent1"/>
+          </a:lnRef>
+          <a:fillRef idx="0">
+            <a:schemeClr val="accent1"/>
+          </a:fillRef>
+          <a:effectRef idx="0">
+            <a:schemeClr val="accent1"/>
+          </a:effectRef>
+          <a:fontRef idx="minor">
+            <a:schemeClr val="tx1"/>
+          </a:fontRef>
+        </p:style>
+      </p:cxnSp>
+      <p:cxnSp>
+        <p:nvCxnSpPr>
+          <p:cNvPr id="9" name="Straight Arrow Connector 8">
+            <a:extLst>
+              <a:ext uri="{FF2B5EF4-FFF2-40B4-BE49-F238E27FC236}">
+                <a16:creationId xmlns:a16="http://schemas.microsoft.com/office/drawing/2014/main" id="{DD16E2E7-5454-4B1F-BD77-C50191E488D7}"/>
+              </a:ext>
+            </a:extLst>
+          </p:cNvPr>
+          <p:cNvCxnSpPr>
+            <a:cxnSpLocks/>
+            <a:endCxn id="20" idx="3"/>
+          </p:cNvCxnSpPr>
+          <p:nvPr/>
+        </p:nvCxnSpPr>
+        <p:spPr>
+          <a:xfrm flipV="1">
+            <a:off x="6348549" y="3126651"/>
+            <a:ext cx="3156411" cy="2160002"/>
+          </a:xfrm>
+          <a:prstGeom prst="straightConnector1">
+            <a:avLst/>
+          </a:prstGeom>
+          <a:ln>
+            <a:tailEnd type="triangle"/>
+          </a:ln>
+        </p:spPr>
+        <p:style>
+          <a:lnRef idx="1">
+            <a:schemeClr val="accent1"/>
+          </a:lnRef>
+          <a:fillRef idx="0">
+            <a:schemeClr val="accent1"/>
+          </a:fillRef>
+          <a:effectRef idx="0">
+            <a:schemeClr val="accent1"/>
+          </a:effectRef>
+          <a:fontRef idx="minor">
+            <a:schemeClr val="tx1"/>
+          </a:fontRef>
+        </p:style>
+      </p:cxnSp>
+      <p:sp>
+        <p:nvSpPr>
+          <p:cNvPr id="16" name="Arrow: Right 15">
+            <a:extLst>
+              <a:ext uri="{FF2B5EF4-FFF2-40B4-BE49-F238E27FC236}">
+                <a16:creationId xmlns:a16="http://schemas.microsoft.com/office/drawing/2014/main" id="{EC3E02F7-C911-4B15-986D-BECEDA976AA0}"/>
+              </a:ext>
+            </a:extLst>
+          </p:cNvPr>
+          <p:cNvSpPr/>
+          <p:nvPr/>
+        </p:nvSpPr>
+        <p:spPr>
+          <a:xfrm rot="19647253">
+            <a:off x="2375524" y="1859630"/>
+            <a:ext cx="514352" cy="365486"/>
+          </a:xfrm>
+          <a:prstGeom prst="rightArrow">
+            <a:avLst/>
+          </a:prstGeom>
+        </p:spPr>
+        <p:style>
+          <a:lnRef idx="2">
+            <a:schemeClr val="accent1">
+              <a:shade val="50000"/>
+            </a:schemeClr>
+          </a:lnRef>
+          <a:fillRef idx="1">
+            <a:schemeClr val="accent1"/>
+          </a:fillRef>
+          <a:effectRef idx="0">
+            <a:schemeClr val="accent1"/>
+          </a:effectRef>
+          <a:fontRef idx="minor">
+            <a:schemeClr val="lt1"/>
+          </a:fontRef>
+        </p:style>
+        <p:txBody>
+          <a:bodyPr rtlCol="0" anchor="ctr"/>
+          <a:lstStyle/>
+          <a:p>
+            <a:pPr algn="ctr"/>
+            <a:endParaRPr lang="en-US"/>
+          </a:p>
+        </p:txBody>
+      </p:sp>
+      <p:sp>
+        <p:nvSpPr>
+          <p:cNvPr id="17" name="Arrow: Right 16">
+            <a:extLst>
+              <a:ext uri="{FF2B5EF4-FFF2-40B4-BE49-F238E27FC236}">
+                <a16:creationId xmlns:a16="http://schemas.microsoft.com/office/drawing/2014/main" id="{B0E3604C-14B9-4E54-A115-E8792CF3F40D}"/>
+              </a:ext>
+            </a:extLst>
+          </p:cNvPr>
+          <p:cNvSpPr/>
+          <p:nvPr/>
+        </p:nvSpPr>
+        <p:spPr>
+          <a:xfrm rot="18123071">
+            <a:off x="4523322" y="3787366"/>
+            <a:ext cx="565443" cy="332462"/>
+          </a:xfrm>
+          <a:prstGeom prst="rightArrow">
+            <a:avLst/>
+          </a:prstGeom>
+        </p:spPr>
+        <p:style>
+          <a:lnRef idx="2">
+            <a:schemeClr val="accent1">
+              <a:shade val="50000"/>
+            </a:schemeClr>
+          </a:lnRef>
+          <a:fillRef idx="1">
+            <a:schemeClr val="accent1"/>
+          </a:fillRef>
+          <a:effectRef idx="0">
+            <a:schemeClr val="accent1"/>
+          </a:effectRef>
+          <a:fontRef idx="minor">
+            <a:schemeClr val="lt1"/>
+          </a:fontRef>
+        </p:style>
+        <p:txBody>
+          <a:bodyPr rtlCol="0" anchor="ctr"/>
+          <a:lstStyle/>
+          <a:p>
+            <a:pPr algn="ctr"/>
+            <a:endParaRPr lang="en-US"/>
+          </a:p>
+        </p:txBody>
+      </p:sp>
+      <p:sp>
+        <p:nvSpPr>
+          <p:cNvPr id="18" name="Arrow: Right 17">
+            <a:extLst>
+              <a:ext uri="{FF2B5EF4-FFF2-40B4-BE49-F238E27FC236}">
+                <a16:creationId xmlns:a16="http://schemas.microsoft.com/office/drawing/2014/main" id="{8398161B-15AD-43F9-BEC2-A5A2D4A07053}"/>
+              </a:ext>
+            </a:extLst>
+          </p:cNvPr>
+          <p:cNvSpPr/>
+          <p:nvPr/>
+        </p:nvSpPr>
+        <p:spPr>
+          <a:xfrm rot="14130488">
+            <a:off x="7464032" y="3729697"/>
+            <a:ext cx="565443" cy="332462"/>
+          </a:xfrm>
+          <a:prstGeom prst="rightArrow">
+            <a:avLst/>
+          </a:prstGeom>
+        </p:spPr>
+        <p:style>
+          <a:lnRef idx="2">
+            <a:schemeClr val="accent1">
+              <a:shade val="50000"/>
+            </a:schemeClr>
+          </a:lnRef>
+          <a:fillRef idx="1">
+            <a:schemeClr val="accent1"/>
+          </a:fillRef>
+          <a:effectRef idx="0">
+            <a:schemeClr val="accent1"/>
+          </a:effectRef>
+          <a:fontRef idx="minor">
+            <a:schemeClr val="lt1"/>
+          </a:fontRef>
+        </p:style>
+        <p:txBody>
+          <a:bodyPr rtlCol="0" anchor="ctr"/>
+          <a:lstStyle/>
+          <a:p>
+            <a:pPr algn="ctr"/>
+            <a:endParaRPr lang="en-US"/>
+          </a:p>
+        </p:txBody>
+      </p:sp>
+      <p:sp>
+        <p:nvSpPr>
+          <p:cNvPr id="20" name="Rectangle 19">
+            <a:extLst>
+              <a:ext uri="{FF2B5EF4-FFF2-40B4-BE49-F238E27FC236}">
+                <a16:creationId xmlns:a16="http://schemas.microsoft.com/office/drawing/2014/main" id="{B3BDF3B1-C08C-4982-8549-0EF07AA5B511}"/>
+              </a:ext>
+            </a:extLst>
+          </p:cNvPr>
+          <p:cNvSpPr/>
+          <p:nvPr/>
+        </p:nvSpPr>
+        <p:spPr>
+          <a:xfrm>
+            <a:off x="1584960" y="966651"/>
+            <a:ext cx="7920000" cy="4320000"/>
+          </a:xfrm>
+          <a:prstGeom prst="rect">
+            <a:avLst/>
+          </a:prstGeom>
+          <a:noFill/>
+        </p:spPr>
+        <p:style>
+          <a:lnRef idx="2">
+            <a:schemeClr val="dk1"/>
+          </a:lnRef>
+          <a:fillRef idx="1">
+            <a:schemeClr val="lt1"/>
+          </a:fillRef>
+          <a:effectRef idx="0">
+            <a:schemeClr val="dk1"/>
+          </a:effectRef>
+          <a:fontRef idx="minor">
+            <a:schemeClr val="dk1"/>
+          </a:fontRef>
+        </p:style>
+        <p:txBody>
+          <a:bodyPr rtlCol="0" anchor="ctr"/>
+          <a:lstStyle/>
+          <a:p>
+            <a:pPr algn="ctr"/>
+            <a:endParaRPr lang="en-US" dirty="0"/>
+          </a:p>
+        </p:txBody>
+      </p:sp>
+      <p:sp>
+        <p:nvSpPr>
+          <p:cNvPr id="32" name="Rectangle 31">
+            <a:extLst>
+              <a:ext uri="{FF2B5EF4-FFF2-40B4-BE49-F238E27FC236}">
+                <a16:creationId xmlns:a16="http://schemas.microsoft.com/office/drawing/2014/main" id="{096D94FD-2A43-4838-97AF-C2377D7C3843}"/>
+              </a:ext>
+            </a:extLst>
+          </p:cNvPr>
+          <p:cNvSpPr/>
+          <p:nvPr/>
+        </p:nvSpPr>
+        <p:spPr>
+          <a:xfrm>
+            <a:off x="1224960" y="606651"/>
+            <a:ext cx="8640000" cy="5040000"/>
+          </a:xfrm>
+          <a:prstGeom prst="rect">
+            <a:avLst/>
+          </a:prstGeom>
+          <a:noFill/>
+        </p:spPr>
+        <p:style>
+          <a:lnRef idx="2">
+            <a:schemeClr val="dk1"/>
+          </a:lnRef>
+          <a:fillRef idx="1">
+            <a:schemeClr val="lt1"/>
+          </a:fillRef>
+          <a:effectRef idx="0">
+            <a:schemeClr val="dk1"/>
+          </a:effectRef>
+          <a:fontRef idx="minor">
+            <a:schemeClr val="dk1"/>
+          </a:fontRef>
+        </p:style>
+        <p:txBody>
+          <a:bodyPr rtlCol="0" anchor="ctr"/>
+          <a:lstStyle/>
+          <a:p>
+            <a:pPr algn="ctr"/>
+            <a:endParaRPr lang="en-US" dirty="0"/>
+          </a:p>
+        </p:txBody>
+      </p:sp>
+      <p:sp>
+        <p:nvSpPr>
+          <p:cNvPr id="33" name="Oval 32">
+            <a:extLst>
+              <a:ext uri="{FF2B5EF4-FFF2-40B4-BE49-F238E27FC236}">
+                <a16:creationId xmlns:a16="http://schemas.microsoft.com/office/drawing/2014/main" id="{2BB3B1B4-C170-4496-A088-9124FE173539}"/>
+              </a:ext>
+            </a:extLst>
+          </p:cNvPr>
+          <p:cNvSpPr>
+            <a:spLocks noChangeAspect="1"/>
+          </p:cNvSpPr>
+          <p:nvPr/>
+        </p:nvSpPr>
+        <p:spPr>
+          <a:xfrm>
+            <a:off x="468858" y="736395"/>
+            <a:ext cx="180000" cy="180000"/>
+          </a:xfrm>
+          <a:prstGeom prst="ellipse">
+            <a:avLst/>
+          </a:prstGeom>
+          <a:solidFill>
+            <a:srgbClr val="9999FF"/>
+          </a:solidFill>
+          <a:ln>
+            <a:noFill/>
+          </a:ln>
+        </p:spPr>
+        <p:style>
+          <a:lnRef idx="2">
+            <a:schemeClr val="accent1">
+              <a:shade val="50000"/>
+            </a:schemeClr>
+          </a:lnRef>
+          <a:fillRef idx="1">
+            <a:schemeClr val="accent1"/>
+          </a:fillRef>
+          <a:effectRef idx="0">
+            <a:schemeClr val="accent1"/>
+          </a:effectRef>
+          <a:fontRef idx="minor">
+            <a:schemeClr val="lt1"/>
+          </a:fontRef>
+        </p:style>
+        <p:txBody>
+          <a:bodyPr rtlCol="0" anchor="ctr"/>
+          <a:lstStyle/>
+          <a:p>
+            <a:pPr algn="ctr"/>
+            <a:endParaRPr lang="en-US"/>
+          </a:p>
+        </p:txBody>
+      </p:sp>
+      <p:sp>
+        <p:nvSpPr>
+          <p:cNvPr id="35" name="Oval 34">
+            <a:extLst>
+              <a:ext uri="{FF2B5EF4-FFF2-40B4-BE49-F238E27FC236}">
+                <a16:creationId xmlns:a16="http://schemas.microsoft.com/office/drawing/2014/main" id="{A15C3F34-650A-448B-A763-FCABE658D45C}"/>
+              </a:ext>
+            </a:extLst>
+          </p:cNvPr>
+          <p:cNvSpPr>
+            <a:spLocks noChangeAspect="1"/>
+          </p:cNvSpPr>
+          <p:nvPr/>
+        </p:nvSpPr>
+        <p:spPr>
+          <a:xfrm>
+            <a:off x="780892" y="736395"/>
+            <a:ext cx="180000" cy="180000"/>
+          </a:xfrm>
+          <a:prstGeom prst="ellipse">
+            <a:avLst/>
+          </a:prstGeom>
+          <a:solidFill>
+            <a:srgbClr val="956333"/>
+          </a:solidFill>
+          <a:ln>
+            <a:noFill/>
+          </a:ln>
+        </p:spPr>
+        <p:style>
+          <a:lnRef idx="2">
+            <a:schemeClr val="accent1">
+              <a:shade val="50000"/>
+            </a:schemeClr>
+          </a:lnRef>
+          <a:fillRef idx="1">
+            <a:schemeClr val="accent1"/>
+          </a:fillRef>
+          <a:effectRef idx="0">
+            <a:schemeClr val="accent1"/>
+          </a:effectRef>
+          <a:fontRef idx="minor">
+            <a:schemeClr val="lt1"/>
+          </a:fontRef>
+        </p:style>
+        <p:txBody>
+          <a:bodyPr rtlCol="0" anchor="ctr"/>
+          <a:lstStyle/>
+          <a:p>
+            <a:pPr algn="ctr"/>
+            <a:endParaRPr lang="en-US"/>
+          </a:p>
+        </p:txBody>
+      </p:sp>
+      <p:cxnSp>
+        <p:nvCxnSpPr>
+          <p:cNvPr id="107" name="Straight Connector 106">
+            <a:extLst>
+              <a:ext uri="{FF2B5EF4-FFF2-40B4-BE49-F238E27FC236}">
+                <a16:creationId xmlns:a16="http://schemas.microsoft.com/office/drawing/2014/main" id="{632E4A0B-44C3-48D6-8182-D2A987AD2751}"/>
+              </a:ext>
+            </a:extLst>
+          </p:cNvPr>
+          <p:cNvCxnSpPr>
+            <a:cxnSpLocks/>
+          </p:cNvCxnSpPr>
+          <p:nvPr/>
+        </p:nvCxnSpPr>
+        <p:spPr>
+          <a:xfrm>
+            <a:off x="6348549" y="5286651"/>
+            <a:ext cx="0" cy="360000"/>
+          </a:xfrm>
+          <a:prstGeom prst="line">
+            <a:avLst/>
+          </a:prstGeom>
+        </p:spPr>
+        <p:style>
+          <a:lnRef idx="1">
+            <a:schemeClr val="accent2"/>
+          </a:lnRef>
+          <a:fillRef idx="0">
+            <a:schemeClr val="accent2"/>
+          </a:fillRef>
+          <a:effectRef idx="0">
+            <a:schemeClr val="accent2"/>
+          </a:effectRef>
+          <a:fontRef idx="minor">
+            <a:schemeClr val="tx1"/>
+          </a:fontRef>
+        </p:style>
+      </p:cxnSp>
+      <p:cxnSp>
+        <p:nvCxnSpPr>
+          <p:cNvPr id="109" name="Straight Connector 108">
+            <a:extLst>
+              <a:ext uri="{FF2B5EF4-FFF2-40B4-BE49-F238E27FC236}">
+                <a16:creationId xmlns:a16="http://schemas.microsoft.com/office/drawing/2014/main" id="{84E77061-90E3-439F-B38A-66DDCFC46F30}"/>
+              </a:ext>
+            </a:extLst>
+          </p:cNvPr>
+          <p:cNvCxnSpPr>
+            <a:cxnSpLocks/>
+          </p:cNvCxnSpPr>
+          <p:nvPr/>
+        </p:nvCxnSpPr>
+        <p:spPr>
+          <a:xfrm rot="-2040000">
+            <a:off x="9605614" y="3093074"/>
+            <a:ext cx="0" cy="360000"/>
+          </a:xfrm>
+          <a:prstGeom prst="line">
+            <a:avLst/>
+          </a:prstGeom>
+        </p:spPr>
+        <p:style>
+          <a:lnRef idx="1">
+            <a:schemeClr val="accent2"/>
+          </a:lnRef>
+          <a:fillRef idx="0">
+            <a:schemeClr val="accent2"/>
+          </a:fillRef>
+          <a:effectRef idx="0">
+            <a:schemeClr val="accent2"/>
+          </a:effectRef>
+          <a:fontRef idx="minor">
+            <a:schemeClr val="tx1"/>
+          </a:fontRef>
+        </p:style>
+      </p:cxnSp>
+      <p:cxnSp>
+        <p:nvCxnSpPr>
+          <p:cNvPr id="111" name="Straight Connector 110">
+            <a:extLst>
+              <a:ext uri="{FF2B5EF4-FFF2-40B4-BE49-F238E27FC236}">
+                <a16:creationId xmlns:a16="http://schemas.microsoft.com/office/drawing/2014/main" id="{F2CEB4C4-0903-4190-9963-B5E6BF721C89}"/>
+              </a:ext>
+            </a:extLst>
+          </p:cNvPr>
+          <p:cNvCxnSpPr>
+            <a:cxnSpLocks/>
+          </p:cNvCxnSpPr>
+          <p:nvPr/>
+        </p:nvCxnSpPr>
+        <p:spPr>
+          <a:xfrm rot="1800000">
+            <a:off x="6258549" y="5262536"/>
+            <a:ext cx="0" cy="360000"/>
+          </a:xfrm>
+          <a:prstGeom prst="line">
+            <a:avLst/>
+          </a:prstGeom>
+        </p:spPr>
+        <p:style>
+          <a:lnRef idx="1">
+            <a:schemeClr val="accent2"/>
+          </a:lnRef>
+          <a:fillRef idx="0">
+            <a:schemeClr val="accent2"/>
+          </a:fillRef>
+          <a:effectRef idx="0">
+            <a:schemeClr val="accent2"/>
+          </a:effectRef>
+          <a:fontRef idx="minor">
+            <a:schemeClr val="tx1"/>
+          </a:fontRef>
+        </p:style>
+      </p:cxnSp>
+      <p:cxnSp>
+        <p:nvCxnSpPr>
+          <p:cNvPr id="112" name="Straight Connector 111">
+            <a:extLst>
+              <a:ext uri="{FF2B5EF4-FFF2-40B4-BE49-F238E27FC236}">
+                <a16:creationId xmlns:a16="http://schemas.microsoft.com/office/drawing/2014/main" id="{4289EC38-ADC6-42FD-954D-950E11EB13D6}"/>
+              </a:ext>
+            </a:extLst>
+          </p:cNvPr>
+          <p:cNvCxnSpPr>
+            <a:cxnSpLocks/>
+          </p:cNvCxnSpPr>
+          <p:nvPr/>
+        </p:nvCxnSpPr>
+        <p:spPr>
+          <a:xfrm rot="1800000">
+            <a:off x="2959118" y="3232887"/>
+            <a:ext cx="0" cy="360000"/>
+          </a:xfrm>
+          <a:prstGeom prst="line">
+            <a:avLst/>
+          </a:prstGeom>
+        </p:spPr>
+        <p:style>
+          <a:lnRef idx="1">
+            <a:schemeClr val="accent2"/>
+          </a:lnRef>
+          <a:fillRef idx="0">
+            <a:schemeClr val="accent2"/>
+          </a:fillRef>
+          <a:effectRef idx="0">
+            <a:schemeClr val="accent2"/>
+          </a:effectRef>
+          <a:fontRef idx="minor">
+            <a:schemeClr val="tx1"/>
+          </a:fontRef>
+        </p:style>
+      </p:cxnSp>
+      <p:cxnSp>
+        <p:nvCxnSpPr>
+          <p:cNvPr id="113" name="Straight Connector 112">
+            <a:extLst>
+              <a:ext uri="{FF2B5EF4-FFF2-40B4-BE49-F238E27FC236}">
+                <a16:creationId xmlns:a16="http://schemas.microsoft.com/office/drawing/2014/main" id="{8392E735-AF7E-4873-8093-5E4F093E17CD}"/>
+              </a:ext>
+            </a:extLst>
+          </p:cNvPr>
+          <p:cNvCxnSpPr>
+            <a:cxnSpLocks/>
+          </p:cNvCxnSpPr>
+          <p:nvPr/>
+        </p:nvCxnSpPr>
+        <p:spPr>
+          <a:xfrm rot="3420000">
+            <a:off x="2898718" y="3175038"/>
+            <a:ext cx="0" cy="360000"/>
+          </a:xfrm>
+          <a:prstGeom prst="line">
+            <a:avLst/>
+          </a:prstGeom>
+        </p:spPr>
+        <p:style>
+          <a:lnRef idx="1">
+            <a:schemeClr val="accent2"/>
+          </a:lnRef>
+          <a:fillRef idx="0">
+            <a:schemeClr val="accent2"/>
+          </a:fillRef>
+          <a:effectRef idx="0">
+            <a:schemeClr val="accent2"/>
+          </a:effectRef>
+          <a:fontRef idx="minor">
+            <a:schemeClr val="tx1"/>
+          </a:fontRef>
+        </p:style>
+      </p:cxnSp>
+      <p:cxnSp>
+        <p:nvCxnSpPr>
+          <p:cNvPr id="114" name="Straight Connector 113">
+            <a:extLst>
+              <a:ext uri="{FF2B5EF4-FFF2-40B4-BE49-F238E27FC236}">
+                <a16:creationId xmlns:a16="http://schemas.microsoft.com/office/drawing/2014/main" id="{E54573F8-0FD5-40AB-80CE-3F623E117634}"/>
+              </a:ext>
+            </a:extLst>
+          </p:cNvPr>
+          <p:cNvCxnSpPr>
+            <a:cxnSpLocks/>
+          </p:cNvCxnSpPr>
+          <p:nvPr/>
+        </p:nvCxnSpPr>
+        <p:spPr>
+          <a:xfrm rot="3420000">
+            <a:off x="1434000" y="884683"/>
+            <a:ext cx="0" cy="360000"/>
+          </a:xfrm>
+          <a:prstGeom prst="line">
+            <a:avLst/>
+          </a:prstGeom>
+        </p:spPr>
+        <p:style>
+          <a:lnRef idx="1">
+            <a:schemeClr val="accent2"/>
+          </a:lnRef>
+          <a:fillRef idx="0">
+            <a:schemeClr val="accent2"/>
+          </a:fillRef>
+          <a:effectRef idx="0">
+            <a:schemeClr val="accent2"/>
+          </a:effectRef>
+          <a:fontRef idx="minor">
+            <a:schemeClr val="tx1"/>
+          </a:fontRef>
+        </p:style>
+      </p:cxnSp>
+      <p:cxnSp>
+        <p:nvCxnSpPr>
+          <p:cNvPr id="116" name="Straight Connector 115">
+            <a:extLst>
+              <a:ext uri="{FF2B5EF4-FFF2-40B4-BE49-F238E27FC236}">
+                <a16:creationId xmlns:a16="http://schemas.microsoft.com/office/drawing/2014/main" id="{A2B96A5E-ADFC-4254-B813-7C1AF00F5B6A}"/>
+              </a:ext>
+            </a:extLst>
+          </p:cNvPr>
+          <p:cNvCxnSpPr>
+            <a:cxnSpLocks/>
+          </p:cNvCxnSpPr>
+          <p:nvPr/>
+        </p:nvCxnSpPr>
+        <p:spPr>
+          <a:xfrm rot="-1800000">
+            <a:off x="6438550" y="5262535"/>
+            <a:ext cx="0" cy="360000"/>
+          </a:xfrm>
+          <a:prstGeom prst="line">
+            <a:avLst/>
+          </a:prstGeom>
+        </p:spPr>
+        <p:style>
+          <a:lnRef idx="1">
+            <a:schemeClr val="accent2"/>
+          </a:lnRef>
+          <a:fillRef idx="0">
+            <a:schemeClr val="accent2"/>
+          </a:fillRef>
+          <a:effectRef idx="0">
+            <a:schemeClr val="accent2"/>
+          </a:effectRef>
+          <a:fontRef idx="minor">
+            <a:schemeClr val="tx1"/>
+          </a:fontRef>
+        </p:style>
+      </p:cxnSp>
+      <p:cxnSp>
+        <p:nvCxnSpPr>
+          <p:cNvPr id="118" name="Straight Connector 117">
+            <a:extLst>
+              <a:ext uri="{FF2B5EF4-FFF2-40B4-BE49-F238E27FC236}">
+                <a16:creationId xmlns:a16="http://schemas.microsoft.com/office/drawing/2014/main" id="{946E5244-4670-4869-8297-92740B39FC85}"/>
+              </a:ext>
+            </a:extLst>
+          </p:cNvPr>
+          <p:cNvCxnSpPr/>
+          <p:nvPr/>
+        </p:nvCxnSpPr>
+        <p:spPr>
+          <a:xfrm>
+            <a:off x="1283039" y="1162723"/>
+            <a:ext cx="1464718" cy="2290351"/>
+          </a:xfrm>
+          <a:prstGeom prst="line">
+            <a:avLst/>
+          </a:prstGeom>
+        </p:spPr>
+        <p:style>
+          <a:lnRef idx="1">
+            <a:schemeClr val="accent1"/>
+          </a:lnRef>
+          <a:fillRef idx="0">
+            <a:schemeClr val="accent1"/>
+          </a:fillRef>
+          <a:effectRef idx="0">
+            <a:schemeClr val="accent1"/>
+          </a:effectRef>
+          <a:fontRef idx="minor">
+            <a:schemeClr val="tx1"/>
+          </a:fontRef>
+        </p:style>
+      </p:cxnSp>
+      <p:cxnSp>
+        <p:nvCxnSpPr>
+          <p:cNvPr id="120" name="Straight Connector 119">
+            <a:extLst>
+              <a:ext uri="{FF2B5EF4-FFF2-40B4-BE49-F238E27FC236}">
+                <a16:creationId xmlns:a16="http://schemas.microsoft.com/office/drawing/2014/main" id="{F49634D1-56B1-4B67-8FDC-65E476C9129A}"/>
+              </a:ext>
+            </a:extLst>
+          </p:cNvPr>
+          <p:cNvCxnSpPr/>
+          <p:nvPr/>
+        </p:nvCxnSpPr>
+        <p:spPr>
+          <a:xfrm>
+            <a:off x="2869118" y="3568772"/>
+            <a:ext cx="3299431" cy="2029648"/>
+          </a:xfrm>
+          <a:prstGeom prst="line">
+            <a:avLst/>
+          </a:prstGeom>
+        </p:spPr>
+        <p:style>
+          <a:lnRef idx="1">
+            <a:schemeClr val="accent1"/>
+          </a:lnRef>
+          <a:fillRef idx="0">
+            <a:schemeClr val="accent1"/>
+          </a:fillRef>
+          <a:effectRef idx="0">
+            <a:schemeClr val="accent1"/>
+          </a:effectRef>
+          <a:fontRef idx="minor">
+            <a:schemeClr val="tx1"/>
+          </a:fontRef>
+        </p:style>
+      </p:cxnSp>
+      <p:cxnSp>
+        <p:nvCxnSpPr>
+          <p:cNvPr id="126" name="Straight Connector 125">
+            <a:extLst>
+              <a:ext uri="{FF2B5EF4-FFF2-40B4-BE49-F238E27FC236}">
+                <a16:creationId xmlns:a16="http://schemas.microsoft.com/office/drawing/2014/main" id="{B368C576-22D7-42F3-B293-13E7A86E65BF}"/>
+              </a:ext>
+            </a:extLst>
+          </p:cNvPr>
+          <p:cNvCxnSpPr/>
+          <p:nvPr/>
+        </p:nvCxnSpPr>
+        <p:spPr>
+          <a:xfrm flipV="1">
+            <a:off x="6528550" y="3429000"/>
+            <a:ext cx="3177719" cy="2169420"/>
+          </a:xfrm>
+          <a:prstGeom prst="line">
+            <a:avLst/>
+          </a:prstGeom>
+        </p:spPr>
+        <p:style>
+          <a:lnRef idx="1">
+            <a:schemeClr val="accent1"/>
+          </a:lnRef>
+          <a:fillRef idx="0">
+            <a:schemeClr val="accent1"/>
+          </a:fillRef>
+          <a:effectRef idx="0">
+            <a:schemeClr val="accent1"/>
+          </a:effectRef>
+          <a:fontRef idx="minor">
+            <a:schemeClr val="tx1"/>
+          </a:fontRef>
+        </p:style>
+      </p:cxnSp>
+      <p:sp>
+        <p:nvSpPr>
+          <p:cNvPr id="129" name="Oval 128">
+            <a:extLst>
+              <a:ext uri="{FF2B5EF4-FFF2-40B4-BE49-F238E27FC236}">
+                <a16:creationId xmlns:a16="http://schemas.microsoft.com/office/drawing/2014/main" id="{C2AB23D1-00AB-4488-B967-F233FD4EF43D}"/>
+              </a:ext>
+            </a:extLst>
+          </p:cNvPr>
+          <p:cNvSpPr>
+            <a:spLocks noChangeAspect="1"/>
+          </p:cNvSpPr>
+          <p:nvPr/>
+        </p:nvSpPr>
+        <p:spPr>
+          <a:xfrm>
+            <a:off x="2316278" y="1299973"/>
+            <a:ext cx="180000" cy="180000"/>
+          </a:xfrm>
+          <a:prstGeom prst="ellipse">
+            <a:avLst/>
+          </a:prstGeom>
+          <a:solidFill>
+            <a:srgbClr val="956333"/>
+          </a:solidFill>
+          <a:ln>
+            <a:noFill/>
+          </a:ln>
+        </p:spPr>
+        <p:style>
+          <a:lnRef idx="2">
+            <a:schemeClr val="accent1">
+              <a:shade val="50000"/>
+            </a:schemeClr>
+          </a:lnRef>
+          <a:fillRef idx="1">
+            <a:schemeClr val="accent1"/>
+          </a:fillRef>
+          <a:effectRef idx="0">
+            <a:schemeClr val="accent1"/>
+          </a:effectRef>
+          <a:fontRef idx="minor">
+            <a:schemeClr val="lt1"/>
+          </a:fontRef>
+        </p:style>
+        <p:txBody>
+          <a:bodyPr rtlCol="0" anchor="ctr"/>
+          <a:lstStyle/>
+          <a:p>
+            <a:pPr algn="ctr"/>
+            <a:endParaRPr lang="en-US"/>
+          </a:p>
+        </p:txBody>
+      </p:sp>
+      <p:sp>
+        <p:nvSpPr>
+          <p:cNvPr id="130" name="Oval 129">
+            <a:extLst>
+              <a:ext uri="{FF2B5EF4-FFF2-40B4-BE49-F238E27FC236}">
+                <a16:creationId xmlns:a16="http://schemas.microsoft.com/office/drawing/2014/main" id="{2C5DF737-C2B2-418A-9859-647EE26BD30B}"/>
+              </a:ext>
+            </a:extLst>
+          </p:cNvPr>
+          <p:cNvSpPr>
+            <a:spLocks noChangeAspect="1"/>
+          </p:cNvSpPr>
+          <p:nvPr/>
+        </p:nvSpPr>
+        <p:spPr>
+          <a:xfrm>
+            <a:off x="2837757" y="2424773"/>
+            <a:ext cx="180000" cy="180000"/>
+          </a:xfrm>
+          <a:prstGeom prst="ellipse">
+            <a:avLst/>
+          </a:prstGeom>
+          <a:solidFill>
+            <a:srgbClr val="956333"/>
+          </a:solidFill>
+          <a:ln>
+            <a:noFill/>
+          </a:ln>
+        </p:spPr>
+        <p:style>
+          <a:lnRef idx="2">
+            <a:schemeClr val="accent1">
+              <a:shade val="50000"/>
+            </a:schemeClr>
+          </a:lnRef>
+          <a:fillRef idx="1">
+            <a:schemeClr val="accent1"/>
+          </a:fillRef>
+          <a:effectRef idx="0">
+            <a:schemeClr val="accent1"/>
+          </a:effectRef>
+          <a:fontRef idx="minor">
+            <a:schemeClr val="lt1"/>
+          </a:fontRef>
+        </p:style>
+        <p:txBody>
+          <a:bodyPr rtlCol="0" anchor="ctr"/>
+          <a:lstStyle/>
+          <a:p>
+            <a:pPr algn="ctr"/>
+            <a:endParaRPr lang="en-US"/>
+          </a:p>
+        </p:txBody>
+      </p:sp>
+      <p:sp>
+        <p:nvSpPr>
+          <p:cNvPr id="131" name="Oval 130">
+            <a:extLst>
+              <a:ext uri="{FF2B5EF4-FFF2-40B4-BE49-F238E27FC236}">
+                <a16:creationId xmlns:a16="http://schemas.microsoft.com/office/drawing/2014/main" id="{0D7C0B14-6743-48F0-A8D1-93F7AD5C90C8}"/>
+              </a:ext>
+            </a:extLst>
+          </p:cNvPr>
+          <p:cNvSpPr>
+            <a:spLocks noChangeAspect="1"/>
+          </p:cNvSpPr>
+          <p:nvPr/>
+        </p:nvSpPr>
+        <p:spPr>
+          <a:xfrm>
+            <a:off x="3165751" y="2604946"/>
+            <a:ext cx="180000" cy="180000"/>
+          </a:xfrm>
+          <a:prstGeom prst="ellipse">
+            <a:avLst/>
+          </a:prstGeom>
+          <a:solidFill>
+            <a:srgbClr val="956333"/>
+          </a:solidFill>
+          <a:ln>
+            <a:noFill/>
+          </a:ln>
+        </p:spPr>
+        <p:style>
+          <a:lnRef idx="2">
+            <a:schemeClr val="accent1">
+              <a:shade val="50000"/>
+            </a:schemeClr>
+          </a:lnRef>
+          <a:fillRef idx="1">
+            <a:schemeClr val="accent1"/>
+          </a:fillRef>
+          <a:effectRef idx="0">
+            <a:schemeClr val="accent1"/>
+          </a:effectRef>
+          <a:fontRef idx="minor">
+            <a:schemeClr val="lt1"/>
+          </a:fontRef>
+        </p:style>
+        <p:txBody>
+          <a:bodyPr rtlCol="0" anchor="ctr"/>
+          <a:lstStyle/>
+          <a:p>
+            <a:pPr algn="ctr"/>
+            <a:endParaRPr lang="en-US"/>
+          </a:p>
+        </p:txBody>
+      </p:sp>
+      <p:sp>
+        <p:nvSpPr>
+          <p:cNvPr id="132" name="Oval 131">
+            <a:extLst>
+              <a:ext uri="{FF2B5EF4-FFF2-40B4-BE49-F238E27FC236}">
+                <a16:creationId xmlns:a16="http://schemas.microsoft.com/office/drawing/2014/main" id="{4E5DA3BA-969D-43EA-889F-668BABF07061}"/>
+              </a:ext>
+            </a:extLst>
+          </p:cNvPr>
+          <p:cNvSpPr>
+            <a:spLocks noChangeAspect="1"/>
+          </p:cNvSpPr>
+          <p:nvPr/>
+        </p:nvSpPr>
+        <p:spPr>
+          <a:xfrm>
+            <a:off x="3360160" y="3044843"/>
+            <a:ext cx="180000" cy="180000"/>
+          </a:xfrm>
+          <a:prstGeom prst="ellipse">
+            <a:avLst/>
+          </a:prstGeom>
+          <a:solidFill>
+            <a:srgbClr val="956333"/>
+          </a:solidFill>
+          <a:ln>
+            <a:noFill/>
+          </a:ln>
+        </p:spPr>
+        <p:style>
+          <a:lnRef idx="2">
+            <a:schemeClr val="accent1">
+              <a:shade val="50000"/>
+            </a:schemeClr>
+          </a:lnRef>
+          <a:fillRef idx="1">
+            <a:schemeClr val="accent1"/>
+          </a:fillRef>
+          <a:effectRef idx="0">
+            <a:schemeClr val="accent1"/>
+          </a:effectRef>
+          <a:fontRef idx="minor">
+            <a:schemeClr val="lt1"/>
+          </a:fontRef>
+        </p:style>
+        <p:txBody>
+          <a:bodyPr rtlCol="0" anchor="ctr"/>
+          <a:lstStyle/>
+          <a:p>
+            <a:pPr algn="ctr"/>
+            <a:endParaRPr lang="en-US"/>
+          </a:p>
+        </p:txBody>
+      </p:sp>
+      <p:sp>
+        <p:nvSpPr>
+          <p:cNvPr id="133" name="Oval 132">
+            <a:extLst>
+              <a:ext uri="{FF2B5EF4-FFF2-40B4-BE49-F238E27FC236}">
+                <a16:creationId xmlns:a16="http://schemas.microsoft.com/office/drawing/2014/main" id="{8480C6A0-9FF4-4AC6-BE0C-3A54DC91641B}"/>
+              </a:ext>
+            </a:extLst>
+          </p:cNvPr>
+          <p:cNvSpPr>
+            <a:spLocks noChangeAspect="1"/>
+          </p:cNvSpPr>
+          <p:nvPr/>
+        </p:nvSpPr>
+        <p:spPr>
+          <a:xfrm>
+            <a:off x="3614990" y="3118772"/>
+            <a:ext cx="180000" cy="180000"/>
+          </a:xfrm>
+          <a:prstGeom prst="ellipse">
+            <a:avLst/>
+          </a:prstGeom>
+          <a:solidFill>
+            <a:srgbClr val="956333"/>
+          </a:solidFill>
+          <a:ln>
+            <a:noFill/>
+          </a:ln>
+        </p:spPr>
+        <p:style>
+          <a:lnRef idx="2">
+            <a:schemeClr val="accent1">
+              <a:shade val="50000"/>
+            </a:schemeClr>
+          </a:lnRef>
+          <a:fillRef idx="1">
+            <a:schemeClr val="accent1"/>
+          </a:fillRef>
+          <a:effectRef idx="0">
+            <a:schemeClr val="accent1"/>
+          </a:effectRef>
+          <a:fontRef idx="minor">
+            <a:schemeClr val="lt1"/>
+          </a:fontRef>
+        </p:style>
+        <p:txBody>
+          <a:bodyPr rtlCol="0" anchor="ctr"/>
+          <a:lstStyle/>
+          <a:p>
+            <a:pPr algn="ctr"/>
+            <a:endParaRPr lang="en-US"/>
+          </a:p>
+        </p:txBody>
+      </p:sp>
+      <p:sp>
+        <p:nvSpPr>
+          <p:cNvPr id="134" name="Oval 133">
+            <a:extLst>
+              <a:ext uri="{FF2B5EF4-FFF2-40B4-BE49-F238E27FC236}">
+                <a16:creationId xmlns:a16="http://schemas.microsoft.com/office/drawing/2014/main" id="{05073CD1-F714-4D96-9AB5-93D7A31B3CA8}"/>
+              </a:ext>
+            </a:extLst>
+          </p:cNvPr>
+          <p:cNvSpPr>
+            <a:spLocks noChangeAspect="1"/>
+          </p:cNvSpPr>
+          <p:nvPr/>
+        </p:nvSpPr>
+        <p:spPr>
+          <a:xfrm>
+            <a:off x="3824459" y="3298772"/>
+            <a:ext cx="180000" cy="180000"/>
+          </a:xfrm>
+          <a:prstGeom prst="ellipse">
+            <a:avLst/>
+          </a:prstGeom>
+          <a:solidFill>
+            <a:srgbClr val="956333"/>
+          </a:solidFill>
+          <a:ln>
+            <a:noFill/>
+          </a:ln>
+        </p:spPr>
+        <p:style>
+          <a:lnRef idx="2">
+            <a:schemeClr val="accent1">
+              <a:shade val="50000"/>
+            </a:schemeClr>
+          </a:lnRef>
+          <a:fillRef idx="1">
+            <a:schemeClr val="accent1"/>
+          </a:fillRef>
+          <a:effectRef idx="0">
+            <a:schemeClr val="accent1"/>
+          </a:effectRef>
+          <a:fontRef idx="minor">
+            <a:schemeClr val="lt1"/>
+          </a:fontRef>
+        </p:style>
+        <p:txBody>
+          <a:bodyPr rtlCol="0" anchor="ctr"/>
+          <a:lstStyle/>
+          <a:p>
+            <a:pPr algn="ctr"/>
+            <a:endParaRPr lang="en-US"/>
+          </a:p>
+        </p:txBody>
+      </p:sp>
+      <p:sp>
+        <p:nvSpPr>
+          <p:cNvPr id="135" name="Oval 134">
+            <a:extLst>
+              <a:ext uri="{FF2B5EF4-FFF2-40B4-BE49-F238E27FC236}">
+                <a16:creationId xmlns:a16="http://schemas.microsoft.com/office/drawing/2014/main" id="{62F47514-128D-43F1-A737-5BB48095CE3E}"/>
+              </a:ext>
+            </a:extLst>
+          </p:cNvPr>
+          <p:cNvSpPr>
+            <a:spLocks noChangeAspect="1"/>
+          </p:cNvSpPr>
+          <p:nvPr/>
+        </p:nvSpPr>
+        <p:spPr>
+          <a:xfrm>
+            <a:off x="4176425" y="3535754"/>
+            <a:ext cx="180000" cy="180000"/>
+          </a:xfrm>
+          <a:prstGeom prst="ellipse">
+            <a:avLst/>
+          </a:prstGeom>
+          <a:solidFill>
+            <a:srgbClr val="956333"/>
+          </a:solidFill>
+          <a:ln>
+            <a:noFill/>
+          </a:ln>
+        </p:spPr>
+        <p:style>
+          <a:lnRef idx="2">
+            <a:schemeClr val="accent1">
+              <a:shade val="50000"/>
+            </a:schemeClr>
+          </a:lnRef>
+          <a:fillRef idx="1">
+            <a:schemeClr val="accent1"/>
+          </a:fillRef>
+          <a:effectRef idx="0">
+            <a:schemeClr val="accent1"/>
+          </a:effectRef>
+          <a:fontRef idx="minor">
+            <a:schemeClr val="lt1"/>
+          </a:fontRef>
+        </p:style>
+        <p:txBody>
+          <a:bodyPr rtlCol="0" anchor="ctr"/>
+          <a:lstStyle/>
+          <a:p>
+            <a:pPr algn="ctr"/>
+            <a:endParaRPr lang="en-US"/>
+          </a:p>
+        </p:txBody>
+      </p:sp>
+      <p:sp>
+        <p:nvSpPr>
+          <p:cNvPr id="136" name="Oval 135">
+            <a:extLst>
+              <a:ext uri="{FF2B5EF4-FFF2-40B4-BE49-F238E27FC236}">
+                <a16:creationId xmlns:a16="http://schemas.microsoft.com/office/drawing/2014/main" id="{CEC83941-9AD4-4A2D-B59C-FDEF75F980D3}"/>
+              </a:ext>
+            </a:extLst>
+          </p:cNvPr>
+          <p:cNvSpPr>
+            <a:spLocks noChangeAspect="1"/>
+          </p:cNvSpPr>
+          <p:nvPr/>
+        </p:nvSpPr>
+        <p:spPr>
+          <a:xfrm>
+            <a:off x="4333324" y="3721117"/>
+            <a:ext cx="180000" cy="180000"/>
+          </a:xfrm>
+          <a:prstGeom prst="ellipse">
+            <a:avLst/>
+          </a:prstGeom>
+          <a:solidFill>
+            <a:srgbClr val="956333"/>
+          </a:solidFill>
+          <a:ln>
+            <a:noFill/>
+          </a:ln>
+        </p:spPr>
+        <p:style>
+          <a:lnRef idx="2">
+            <a:schemeClr val="accent1">
+              <a:shade val="50000"/>
+            </a:schemeClr>
+          </a:lnRef>
+          <a:fillRef idx="1">
+            <a:schemeClr val="accent1"/>
+          </a:fillRef>
+          <a:effectRef idx="0">
+            <a:schemeClr val="accent1"/>
+          </a:effectRef>
+          <a:fontRef idx="minor">
+            <a:schemeClr val="lt1"/>
+          </a:fontRef>
+        </p:style>
+        <p:txBody>
+          <a:bodyPr rtlCol="0" anchor="ctr"/>
+          <a:lstStyle/>
+          <a:p>
+            <a:pPr algn="ctr"/>
+            <a:endParaRPr lang="en-US"/>
+          </a:p>
+        </p:txBody>
+      </p:sp>
+      <p:sp>
+        <p:nvSpPr>
+          <p:cNvPr id="137" name="Oval 136">
+            <a:extLst>
+              <a:ext uri="{FF2B5EF4-FFF2-40B4-BE49-F238E27FC236}">
+                <a16:creationId xmlns:a16="http://schemas.microsoft.com/office/drawing/2014/main" id="{571E9353-9B68-43EF-8FB6-58E8AD87D5F3}"/>
+              </a:ext>
+            </a:extLst>
+          </p:cNvPr>
+          <p:cNvSpPr>
+            <a:spLocks noChangeAspect="1"/>
+          </p:cNvSpPr>
+          <p:nvPr/>
+        </p:nvSpPr>
+        <p:spPr>
+          <a:xfrm>
+            <a:off x="4541189" y="3507263"/>
+            <a:ext cx="180000" cy="180000"/>
+          </a:xfrm>
+          <a:prstGeom prst="ellipse">
+            <a:avLst/>
+          </a:prstGeom>
+          <a:solidFill>
+            <a:srgbClr val="956333"/>
+          </a:solidFill>
+          <a:ln>
+            <a:noFill/>
+          </a:ln>
+        </p:spPr>
+        <p:style>
+          <a:lnRef idx="2">
+            <a:schemeClr val="accent1">
+              <a:shade val="50000"/>
+            </a:schemeClr>
+          </a:lnRef>
+          <a:fillRef idx="1">
+            <a:schemeClr val="accent1"/>
+          </a:fillRef>
+          <a:effectRef idx="0">
+            <a:schemeClr val="accent1"/>
+          </a:effectRef>
+          <a:fontRef idx="minor">
+            <a:schemeClr val="lt1"/>
+          </a:fontRef>
+        </p:style>
+        <p:txBody>
+          <a:bodyPr rtlCol="0" anchor="ctr"/>
+          <a:lstStyle/>
+          <a:p>
+            <a:pPr algn="ctr"/>
+            <a:endParaRPr lang="en-US"/>
+          </a:p>
+        </p:txBody>
+      </p:sp>
+      <p:sp>
+        <p:nvSpPr>
+          <p:cNvPr id="138" name="Oval 137">
+            <a:extLst>
+              <a:ext uri="{FF2B5EF4-FFF2-40B4-BE49-F238E27FC236}">
+                <a16:creationId xmlns:a16="http://schemas.microsoft.com/office/drawing/2014/main" id="{09EED934-50A1-417B-809A-499E739B5AB5}"/>
+              </a:ext>
+            </a:extLst>
+          </p:cNvPr>
+          <p:cNvSpPr>
+            <a:spLocks noChangeAspect="1"/>
+          </p:cNvSpPr>
+          <p:nvPr/>
+        </p:nvSpPr>
+        <p:spPr>
+          <a:xfrm>
+            <a:off x="5417004" y="3721824"/>
+            <a:ext cx="180000" cy="180000"/>
+          </a:xfrm>
+          <a:prstGeom prst="ellipse">
+            <a:avLst/>
+          </a:prstGeom>
+          <a:solidFill>
+            <a:srgbClr val="956333"/>
+          </a:solidFill>
+          <a:ln>
+            <a:noFill/>
+          </a:ln>
+        </p:spPr>
+        <p:style>
+          <a:lnRef idx="2">
+            <a:schemeClr val="accent1">
+              <a:shade val="50000"/>
+            </a:schemeClr>
+          </a:lnRef>
+          <a:fillRef idx="1">
+            <a:schemeClr val="accent1"/>
+          </a:fillRef>
+          <a:effectRef idx="0">
+            <a:schemeClr val="accent1"/>
+          </a:effectRef>
+          <a:fontRef idx="minor">
+            <a:schemeClr val="lt1"/>
+          </a:fontRef>
+        </p:style>
+        <p:txBody>
+          <a:bodyPr rtlCol="0" anchor="ctr"/>
+          <a:lstStyle/>
+          <a:p>
+            <a:pPr algn="ctr"/>
+            <a:endParaRPr lang="en-US"/>
+          </a:p>
+        </p:txBody>
+      </p:sp>
+      <p:sp>
+        <p:nvSpPr>
+          <p:cNvPr id="139" name="Oval 138">
+            <a:extLst>
+              <a:ext uri="{FF2B5EF4-FFF2-40B4-BE49-F238E27FC236}">
+                <a16:creationId xmlns:a16="http://schemas.microsoft.com/office/drawing/2014/main" id="{C26BD72F-08C6-4799-B8FF-EE5A718A9F0A}"/>
+              </a:ext>
+            </a:extLst>
+          </p:cNvPr>
+          <p:cNvSpPr>
+            <a:spLocks noChangeAspect="1"/>
+          </p:cNvSpPr>
+          <p:nvPr/>
+        </p:nvSpPr>
+        <p:spPr>
+          <a:xfrm>
+            <a:off x="5201396" y="4022406"/>
+            <a:ext cx="180000" cy="180000"/>
+          </a:xfrm>
+          <a:prstGeom prst="ellipse">
+            <a:avLst/>
+          </a:prstGeom>
+          <a:solidFill>
+            <a:srgbClr val="956333"/>
+          </a:solidFill>
+          <a:ln>
+            <a:noFill/>
+          </a:ln>
+        </p:spPr>
+        <p:style>
+          <a:lnRef idx="2">
+            <a:schemeClr val="accent1">
+              <a:shade val="50000"/>
+            </a:schemeClr>
+          </a:lnRef>
+          <a:fillRef idx="1">
+            <a:schemeClr val="accent1"/>
+          </a:fillRef>
+          <a:effectRef idx="0">
+            <a:schemeClr val="accent1"/>
+          </a:effectRef>
+          <a:fontRef idx="minor">
+            <a:schemeClr val="lt1"/>
+          </a:fontRef>
+        </p:style>
+        <p:txBody>
+          <a:bodyPr rtlCol="0" anchor="ctr"/>
+          <a:lstStyle/>
+          <a:p>
+            <a:pPr algn="ctr"/>
+            <a:endParaRPr lang="en-US"/>
+          </a:p>
+        </p:txBody>
+      </p:sp>
+      <p:sp>
+        <p:nvSpPr>
+          <p:cNvPr id="140" name="Oval 139">
+            <a:extLst>
+              <a:ext uri="{FF2B5EF4-FFF2-40B4-BE49-F238E27FC236}">
+                <a16:creationId xmlns:a16="http://schemas.microsoft.com/office/drawing/2014/main" id="{7829C3CB-D709-4B25-8C62-F3C5066FE90C}"/>
+              </a:ext>
+            </a:extLst>
+          </p:cNvPr>
+          <p:cNvSpPr>
+            <a:spLocks noChangeAspect="1"/>
+          </p:cNvSpPr>
+          <p:nvPr/>
+        </p:nvSpPr>
+        <p:spPr>
+          <a:xfrm>
+            <a:off x="5369981" y="4403596"/>
+            <a:ext cx="180000" cy="180000"/>
+          </a:xfrm>
+          <a:prstGeom prst="ellipse">
+            <a:avLst/>
+          </a:prstGeom>
+          <a:solidFill>
+            <a:srgbClr val="956333"/>
+          </a:solidFill>
+          <a:ln>
+            <a:noFill/>
+          </a:ln>
+        </p:spPr>
+        <p:style>
+          <a:lnRef idx="2">
+            <a:schemeClr val="accent1">
+              <a:shade val="50000"/>
+            </a:schemeClr>
+          </a:lnRef>
+          <a:fillRef idx="1">
+            <a:schemeClr val="accent1"/>
+          </a:fillRef>
+          <a:effectRef idx="0">
+            <a:schemeClr val="accent1"/>
+          </a:effectRef>
+          <a:fontRef idx="minor">
+            <a:schemeClr val="lt1"/>
+          </a:fontRef>
+        </p:style>
+        <p:txBody>
+          <a:bodyPr rtlCol="0" anchor="ctr"/>
+          <a:lstStyle/>
+          <a:p>
+            <a:pPr algn="ctr"/>
+            <a:endParaRPr lang="en-US"/>
+          </a:p>
+        </p:txBody>
+      </p:sp>
+      <p:sp>
+        <p:nvSpPr>
+          <p:cNvPr id="141" name="Oval 140">
+            <a:extLst>
+              <a:ext uri="{FF2B5EF4-FFF2-40B4-BE49-F238E27FC236}">
+                <a16:creationId xmlns:a16="http://schemas.microsoft.com/office/drawing/2014/main" id="{BF219F4B-8B77-499B-8336-9C097EC3D01E}"/>
+              </a:ext>
+            </a:extLst>
+          </p:cNvPr>
+          <p:cNvSpPr>
+            <a:spLocks noChangeAspect="1"/>
+          </p:cNvSpPr>
+          <p:nvPr/>
+        </p:nvSpPr>
+        <p:spPr>
+          <a:xfrm>
+            <a:off x="5918156" y="4492508"/>
+            <a:ext cx="180000" cy="180000"/>
+          </a:xfrm>
+          <a:prstGeom prst="ellipse">
+            <a:avLst/>
+          </a:prstGeom>
+          <a:solidFill>
+            <a:srgbClr val="956333"/>
+          </a:solidFill>
+          <a:ln>
+            <a:noFill/>
+          </a:ln>
+        </p:spPr>
+        <p:style>
+          <a:lnRef idx="2">
+            <a:schemeClr val="accent1">
+              <a:shade val="50000"/>
+            </a:schemeClr>
+          </a:lnRef>
+          <a:fillRef idx="1">
+            <a:schemeClr val="accent1"/>
+          </a:fillRef>
+          <a:effectRef idx="0">
+            <a:schemeClr val="accent1"/>
+          </a:effectRef>
+          <a:fontRef idx="minor">
+            <a:schemeClr val="lt1"/>
+          </a:fontRef>
+        </p:style>
+        <p:txBody>
+          <a:bodyPr rtlCol="0" anchor="ctr"/>
+          <a:lstStyle/>
+          <a:p>
+            <a:pPr algn="ctr"/>
+            <a:endParaRPr lang="en-US"/>
+          </a:p>
+        </p:txBody>
+      </p:sp>
+      <p:sp>
+        <p:nvSpPr>
+          <p:cNvPr id="142" name="Oval 141">
+            <a:extLst>
+              <a:ext uri="{FF2B5EF4-FFF2-40B4-BE49-F238E27FC236}">
+                <a16:creationId xmlns:a16="http://schemas.microsoft.com/office/drawing/2014/main" id="{A337F277-1F75-4AA8-B672-508BDE193FFB}"/>
+              </a:ext>
+            </a:extLst>
+          </p:cNvPr>
+          <p:cNvSpPr>
+            <a:spLocks noChangeAspect="1"/>
+          </p:cNvSpPr>
+          <p:nvPr/>
+        </p:nvSpPr>
+        <p:spPr>
+          <a:xfrm>
+            <a:off x="5880498" y="4799579"/>
+            <a:ext cx="180000" cy="180000"/>
+          </a:xfrm>
+          <a:prstGeom prst="ellipse">
+            <a:avLst/>
+          </a:prstGeom>
+          <a:solidFill>
+            <a:srgbClr val="956333"/>
+          </a:solidFill>
+          <a:ln>
+            <a:noFill/>
+          </a:ln>
+        </p:spPr>
+        <p:style>
+          <a:lnRef idx="2">
+            <a:schemeClr val="accent1">
+              <a:shade val="50000"/>
+            </a:schemeClr>
+          </a:lnRef>
+          <a:fillRef idx="1">
+            <a:schemeClr val="accent1"/>
+          </a:fillRef>
+          <a:effectRef idx="0">
+            <a:schemeClr val="accent1"/>
+          </a:effectRef>
+          <a:fontRef idx="minor">
+            <a:schemeClr val="lt1"/>
+          </a:fontRef>
+        </p:style>
+        <p:txBody>
+          <a:bodyPr rtlCol="0" anchor="ctr"/>
+          <a:lstStyle/>
+          <a:p>
+            <a:pPr algn="ctr"/>
+            <a:endParaRPr lang="en-US"/>
+          </a:p>
+        </p:txBody>
+      </p:sp>
+      <p:sp>
+        <p:nvSpPr>
+          <p:cNvPr id="143" name="Oval 142">
+            <a:extLst>
+              <a:ext uri="{FF2B5EF4-FFF2-40B4-BE49-F238E27FC236}">
+                <a16:creationId xmlns:a16="http://schemas.microsoft.com/office/drawing/2014/main" id="{294464D7-C678-4D48-990D-B760E0BDDB7D}"/>
+              </a:ext>
+            </a:extLst>
+          </p:cNvPr>
+          <p:cNvSpPr>
+            <a:spLocks noChangeAspect="1"/>
+          </p:cNvSpPr>
+          <p:nvPr/>
+        </p:nvSpPr>
+        <p:spPr>
+          <a:xfrm>
+            <a:off x="6187051" y="4915920"/>
+            <a:ext cx="180000" cy="180000"/>
+          </a:xfrm>
+          <a:prstGeom prst="ellipse">
+            <a:avLst/>
+          </a:prstGeom>
+          <a:solidFill>
+            <a:srgbClr val="956333"/>
+          </a:solidFill>
+          <a:ln>
+            <a:noFill/>
+          </a:ln>
+        </p:spPr>
+        <p:style>
+          <a:lnRef idx="2">
+            <a:schemeClr val="accent1">
+              <a:shade val="50000"/>
+            </a:schemeClr>
+          </a:lnRef>
+          <a:fillRef idx="1">
+            <a:schemeClr val="accent1"/>
+          </a:fillRef>
+          <a:effectRef idx="0">
+            <a:schemeClr val="accent1"/>
+          </a:effectRef>
+          <a:fontRef idx="minor">
+            <a:schemeClr val="lt1"/>
+          </a:fontRef>
+        </p:style>
+        <p:txBody>
+          <a:bodyPr rtlCol="0" anchor="ctr"/>
+          <a:lstStyle/>
+          <a:p>
+            <a:pPr algn="ctr"/>
+            <a:endParaRPr lang="en-US"/>
+          </a:p>
+        </p:txBody>
+      </p:sp>
+      <p:sp>
+        <p:nvSpPr>
+          <p:cNvPr id="144" name="Oval 143">
+            <a:extLst>
+              <a:ext uri="{FF2B5EF4-FFF2-40B4-BE49-F238E27FC236}">
+                <a16:creationId xmlns:a16="http://schemas.microsoft.com/office/drawing/2014/main" id="{BA6D541F-BA6D-4BAD-BBA8-9D6D3E695051}"/>
+              </a:ext>
+            </a:extLst>
+          </p:cNvPr>
+          <p:cNvSpPr>
+            <a:spLocks noChangeAspect="1"/>
+          </p:cNvSpPr>
+          <p:nvPr/>
+        </p:nvSpPr>
+        <p:spPr>
+          <a:xfrm>
+            <a:off x="6458141" y="4926650"/>
+            <a:ext cx="180000" cy="180000"/>
+          </a:xfrm>
+          <a:prstGeom prst="ellipse">
+            <a:avLst/>
+          </a:prstGeom>
+          <a:solidFill>
+            <a:srgbClr val="956333"/>
+          </a:solidFill>
+          <a:ln>
+            <a:noFill/>
+          </a:ln>
+        </p:spPr>
+        <p:style>
+          <a:lnRef idx="2">
+            <a:schemeClr val="accent1">
+              <a:shade val="50000"/>
+            </a:schemeClr>
+          </a:lnRef>
+          <a:fillRef idx="1">
+            <a:schemeClr val="accent1"/>
+          </a:fillRef>
+          <a:effectRef idx="0">
+            <a:schemeClr val="accent1"/>
+          </a:effectRef>
+          <a:fontRef idx="minor">
+            <a:schemeClr val="lt1"/>
+          </a:fontRef>
+        </p:style>
+        <p:txBody>
+          <a:bodyPr rtlCol="0" anchor="ctr"/>
+          <a:lstStyle/>
+          <a:p>
+            <a:pPr algn="ctr"/>
+            <a:endParaRPr lang="en-US"/>
+          </a:p>
+        </p:txBody>
+      </p:sp>
+      <p:sp>
+        <p:nvSpPr>
+          <p:cNvPr id="145" name="Oval 144">
+            <a:extLst>
+              <a:ext uri="{FF2B5EF4-FFF2-40B4-BE49-F238E27FC236}">
+                <a16:creationId xmlns:a16="http://schemas.microsoft.com/office/drawing/2014/main" id="{1884343F-2C42-47BD-9AD4-2A11F9CDC218}"/>
+              </a:ext>
+            </a:extLst>
+          </p:cNvPr>
+          <p:cNvSpPr>
+            <a:spLocks noChangeAspect="1"/>
+          </p:cNvSpPr>
+          <p:nvPr/>
+        </p:nvSpPr>
+        <p:spPr>
+          <a:xfrm>
+            <a:off x="6744651" y="4624874"/>
+            <a:ext cx="180000" cy="180000"/>
+          </a:xfrm>
+          <a:prstGeom prst="ellipse">
+            <a:avLst/>
+          </a:prstGeom>
+          <a:solidFill>
+            <a:srgbClr val="956333"/>
+          </a:solidFill>
+          <a:ln>
+            <a:noFill/>
+          </a:ln>
+        </p:spPr>
+        <p:style>
+          <a:lnRef idx="2">
+            <a:schemeClr val="accent1">
+              <a:shade val="50000"/>
+            </a:schemeClr>
+          </a:lnRef>
+          <a:fillRef idx="1">
+            <a:schemeClr val="accent1"/>
+          </a:fillRef>
+          <a:effectRef idx="0">
+            <a:schemeClr val="accent1"/>
+          </a:effectRef>
+          <a:fontRef idx="minor">
+            <a:schemeClr val="lt1"/>
+          </a:fontRef>
+        </p:style>
+        <p:txBody>
+          <a:bodyPr rtlCol="0" anchor="ctr"/>
+          <a:lstStyle/>
+          <a:p>
+            <a:pPr algn="ctr"/>
+            <a:endParaRPr lang="en-US"/>
+          </a:p>
+        </p:txBody>
+      </p:sp>
+    </p:spTree>
+    <p:extLst>
+      <p:ext uri="{BB962C8B-B14F-4D97-AF65-F5344CB8AC3E}">
+        <p14:creationId xmlns:p14="http://schemas.microsoft.com/office/powerpoint/2010/main" val="533227737"/>
+      </p:ext>
+    </p:extLst>
+  </p:cSld>
+  <p:clrMapOvr>
+    <a:masterClrMapping/>
+  </p:clrMapOvr>
+</p:sld>
+</file>
+
 <file path=ppt/theme/theme1.xml><?xml version="1.0" encoding="utf-8"?>
 <a:theme xmlns:a="http://schemas.openxmlformats.org/drawingml/2006/main" name="Office Theme">
   <a:themeElements>

</xml_diff>

<commit_message>
test rep; need to cmpt the interaction
</commit_message>
<xml_diff>
--- a/data/draft.pptx
+++ b/data/draft.pptx
@@ -275,7 +275,7 @@
           <a:p>
             <a:fld id="{8837BD83-C95D-452A-8A03-A9CBA33557B0}" type="datetimeFigureOut">
               <a:rPr lang="en-GB" smtClean="0"/>
-              <a:t>05/08/2022</a:t>
+              <a:t>07/08/2022</a:t>
             </a:fld>
             <a:endParaRPr lang="en-GB"/>
           </a:p>
@@ -475,7 +475,7 @@
           <a:p>
             <a:fld id="{8837BD83-C95D-452A-8A03-A9CBA33557B0}" type="datetimeFigureOut">
               <a:rPr lang="en-GB" smtClean="0"/>
-              <a:t>05/08/2022</a:t>
+              <a:t>07/08/2022</a:t>
             </a:fld>
             <a:endParaRPr lang="en-GB"/>
           </a:p>
@@ -685,7 +685,7 @@
           <a:p>
             <a:fld id="{8837BD83-C95D-452A-8A03-A9CBA33557B0}" type="datetimeFigureOut">
               <a:rPr lang="en-GB" smtClean="0"/>
-              <a:t>05/08/2022</a:t>
+              <a:t>07/08/2022</a:t>
             </a:fld>
             <a:endParaRPr lang="en-GB"/>
           </a:p>
@@ -885,7 +885,7 @@
           <a:p>
             <a:fld id="{8837BD83-C95D-452A-8A03-A9CBA33557B0}" type="datetimeFigureOut">
               <a:rPr lang="en-GB" smtClean="0"/>
-              <a:t>05/08/2022</a:t>
+              <a:t>07/08/2022</a:t>
             </a:fld>
             <a:endParaRPr lang="en-GB"/>
           </a:p>
@@ -1161,7 +1161,7 @@
           <a:p>
             <a:fld id="{8837BD83-C95D-452A-8A03-A9CBA33557B0}" type="datetimeFigureOut">
               <a:rPr lang="en-GB" smtClean="0"/>
-              <a:t>05/08/2022</a:t>
+              <a:t>07/08/2022</a:t>
             </a:fld>
             <a:endParaRPr lang="en-GB"/>
           </a:p>
@@ -1429,7 +1429,7 @@
           <a:p>
             <a:fld id="{8837BD83-C95D-452A-8A03-A9CBA33557B0}" type="datetimeFigureOut">
               <a:rPr lang="en-GB" smtClean="0"/>
-              <a:t>05/08/2022</a:t>
+              <a:t>07/08/2022</a:t>
             </a:fld>
             <a:endParaRPr lang="en-GB"/>
           </a:p>
@@ -1844,7 +1844,7 @@
           <a:p>
             <a:fld id="{8837BD83-C95D-452A-8A03-A9CBA33557B0}" type="datetimeFigureOut">
               <a:rPr lang="en-GB" smtClean="0"/>
-              <a:t>05/08/2022</a:t>
+              <a:t>07/08/2022</a:t>
             </a:fld>
             <a:endParaRPr lang="en-GB"/>
           </a:p>
@@ -1986,7 +1986,7 @@
           <a:p>
             <a:fld id="{8837BD83-C95D-452A-8A03-A9CBA33557B0}" type="datetimeFigureOut">
               <a:rPr lang="en-GB" smtClean="0"/>
-              <a:t>05/08/2022</a:t>
+              <a:t>07/08/2022</a:t>
             </a:fld>
             <a:endParaRPr lang="en-GB"/>
           </a:p>
@@ -2099,7 +2099,7 @@
           <a:p>
             <a:fld id="{8837BD83-C95D-452A-8A03-A9CBA33557B0}" type="datetimeFigureOut">
               <a:rPr lang="en-GB" smtClean="0"/>
-              <a:t>05/08/2022</a:t>
+              <a:t>07/08/2022</a:t>
             </a:fld>
             <a:endParaRPr lang="en-GB"/>
           </a:p>
@@ -2412,7 +2412,7 @@
           <a:p>
             <a:fld id="{8837BD83-C95D-452A-8A03-A9CBA33557B0}" type="datetimeFigureOut">
               <a:rPr lang="en-GB" smtClean="0"/>
-              <a:t>05/08/2022</a:t>
+              <a:t>07/08/2022</a:t>
             </a:fld>
             <a:endParaRPr lang="en-GB"/>
           </a:p>
@@ -2701,7 +2701,7 @@
           <a:p>
             <a:fld id="{8837BD83-C95D-452A-8A03-A9CBA33557B0}" type="datetimeFigureOut">
               <a:rPr lang="en-GB" smtClean="0"/>
-              <a:t>05/08/2022</a:t>
+              <a:t>07/08/2022</a:t>
             </a:fld>
             <a:endParaRPr lang="en-GB"/>
           </a:p>
@@ -2944,7 +2944,7 @@
           <a:p>
             <a:fld id="{8837BD83-C95D-452A-8A03-A9CBA33557B0}" type="datetimeFigureOut">
               <a:rPr lang="en-GB" smtClean="0"/>
-              <a:t>05/08/2022</a:t>
+              <a:t>07/08/2022</a:t>
             </a:fld>
             <a:endParaRPr lang="en-GB"/>
           </a:p>
@@ -13024,6 +13024,78 @@
           </a:p>
         </p:txBody>
       </p:sp>
+      <p:cxnSp>
+        <p:nvCxnSpPr>
+          <p:cNvPr id="3" name="Straight Connector 2">
+            <a:extLst>
+              <a:ext uri="{FF2B5EF4-FFF2-40B4-BE49-F238E27FC236}">
+                <a16:creationId xmlns:a16="http://schemas.microsoft.com/office/drawing/2014/main" id="{4E5EB67C-24DF-DA2C-8026-9C44674419B4}"/>
+              </a:ext>
+            </a:extLst>
+          </p:cNvPr>
+          <p:cNvCxnSpPr/>
+          <p:nvPr/>
+        </p:nvCxnSpPr>
+        <p:spPr>
+          <a:xfrm>
+            <a:off x="2747757" y="3453074"/>
+            <a:ext cx="121361" cy="115698"/>
+          </a:xfrm>
+          <a:prstGeom prst="line">
+            <a:avLst/>
+          </a:prstGeom>
+        </p:spPr>
+        <p:style>
+          <a:lnRef idx="1">
+            <a:schemeClr val="accent2"/>
+          </a:lnRef>
+          <a:fillRef idx="0">
+            <a:schemeClr val="accent2"/>
+          </a:fillRef>
+          <a:effectRef idx="0">
+            <a:schemeClr val="accent2"/>
+          </a:effectRef>
+          <a:fontRef idx="minor">
+            <a:schemeClr val="tx1"/>
+          </a:fontRef>
+        </p:style>
+      </p:cxnSp>
+      <p:cxnSp>
+        <p:nvCxnSpPr>
+          <p:cNvPr id="6" name="Straight Connector 5">
+            <a:extLst>
+              <a:ext uri="{FF2B5EF4-FFF2-40B4-BE49-F238E27FC236}">
+                <a16:creationId xmlns:a16="http://schemas.microsoft.com/office/drawing/2014/main" id="{CBF376C2-319E-98CB-C68F-D615E6228E53}"/>
+              </a:ext>
+            </a:extLst>
+          </p:cNvPr>
+          <p:cNvCxnSpPr/>
+          <p:nvPr/>
+        </p:nvCxnSpPr>
+        <p:spPr>
+          <a:xfrm>
+            <a:off x="6168549" y="5598420"/>
+            <a:ext cx="360001" cy="0"/>
+          </a:xfrm>
+          <a:prstGeom prst="line">
+            <a:avLst/>
+          </a:prstGeom>
+        </p:spPr>
+        <p:style>
+          <a:lnRef idx="1">
+            <a:schemeClr val="accent2"/>
+          </a:lnRef>
+          <a:fillRef idx="0">
+            <a:schemeClr val="accent2"/>
+          </a:fillRef>
+          <a:effectRef idx="0">
+            <a:schemeClr val="accent2"/>
+          </a:effectRef>
+          <a:fontRef idx="minor">
+            <a:schemeClr val="tx1"/>
+          </a:fontRef>
+        </p:style>
+      </p:cxnSp>
     </p:spTree>
     <p:extLst>
       <p:ext uri="{BB962C8B-B14F-4D97-AF65-F5344CB8AC3E}">

</xml_diff>

<commit_message>
check rep&av; oscillation caused by interpolation?
</commit_message>
<xml_diff>
--- a/data/draft.pptx
+++ b/data/draft.pptx
@@ -6,9 +6,12 @@
   </p:sldMasterIdLst>
   <p:sldIdLst>
     <p:sldId id="257" r:id="rId2"/>
-    <p:sldId id="258" r:id="rId3"/>
-    <p:sldId id="259" r:id="rId4"/>
-    <p:sldId id="260" r:id="rId5"/>
+    <p:sldId id="261" r:id="rId3"/>
+    <p:sldId id="258" r:id="rId4"/>
+    <p:sldId id="259" r:id="rId5"/>
+    <p:sldId id="260" r:id="rId6"/>
+    <p:sldId id="262" r:id="rId7"/>
+    <p:sldId id="263" r:id="rId8"/>
   </p:sldIdLst>
   <p:sldSz cx="12192000" cy="6858000"/>
   <p:notesSz cx="6797675" cy="9926638"/>
@@ -275,7 +278,7 @@
           <a:p>
             <a:fld id="{8837BD83-C95D-452A-8A03-A9CBA33557B0}" type="datetimeFigureOut">
               <a:rPr lang="en-GB" smtClean="0"/>
-              <a:t>07/08/2022</a:t>
+              <a:t>08/08/2022</a:t>
             </a:fld>
             <a:endParaRPr lang="en-GB"/>
           </a:p>
@@ -475,7 +478,7 @@
           <a:p>
             <a:fld id="{8837BD83-C95D-452A-8A03-A9CBA33557B0}" type="datetimeFigureOut">
               <a:rPr lang="en-GB" smtClean="0"/>
-              <a:t>07/08/2022</a:t>
+              <a:t>08/08/2022</a:t>
             </a:fld>
             <a:endParaRPr lang="en-GB"/>
           </a:p>
@@ -685,7 +688,7 @@
           <a:p>
             <a:fld id="{8837BD83-C95D-452A-8A03-A9CBA33557B0}" type="datetimeFigureOut">
               <a:rPr lang="en-GB" smtClean="0"/>
-              <a:t>07/08/2022</a:t>
+              <a:t>08/08/2022</a:t>
             </a:fld>
             <a:endParaRPr lang="en-GB"/>
           </a:p>
@@ -885,7 +888,7 @@
           <a:p>
             <a:fld id="{8837BD83-C95D-452A-8A03-A9CBA33557B0}" type="datetimeFigureOut">
               <a:rPr lang="en-GB" smtClean="0"/>
-              <a:t>07/08/2022</a:t>
+              <a:t>08/08/2022</a:t>
             </a:fld>
             <a:endParaRPr lang="en-GB"/>
           </a:p>
@@ -1161,7 +1164,7 @@
           <a:p>
             <a:fld id="{8837BD83-C95D-452A-8A03-A9CBA33557B0}" type="datetimeFigureOut">
               <a:rPr lang="en-GB" smtClean="0"/>
-              <a:t>07/08/2022</a:t>
+              <a:t>08/08/2022</a:t>
             </a:fld>
             <a:endParaRPr lang="en-GB"/>
           </a:p>
@@ -1429,7 +1432,7 @@
           <a:p>
             <a:fld id="{8837BD83-C95D-452A-8A03-A9CBA33557B0}" type="datetimeFigureOut">
               <a:rPr lang="en-GB" smtClean="0"/>
-              <a:t>07/08/2022</a:t>
+              <a:t>08/08/2022</a:t>
             </a:fld>
             <a:endParaRPr lang="en-GB"/>
           </a:p>
@@ -1844,7 +1847,7 @@
           <a:p>
             <a:fld id="{8837BD83-C95D-452A-8A03-A9CBA33557B0}" type="datetimeFigureOut">
               <a:rPr lang="en-GB" smtClean="0"/>
-              <a:t>07/08/2022</a:t>
+              <a:t>08/08/2022</a:t>
             </a:fld>
             <a:endParaRPr lang="en-GB"/>
           </a:p>
@@ -1986,7 +1989,7 @@
           <a:p>
             <a:fld id="{8837BD83-C95D-452A-8A03-A9CBA33557B0}" type="datetimeFigureOut">
               <a:rPr lang="en-GB" smtClean="0"/>
-              <a:t>07/08/2022</a:t>
+              <a:t>08/08/2022</a:t>
             </a:fld>
             <a:endParaRPr lang="en-GB"/>
           </a:p>
@@ -2099,7 +2102,7 @@
           <a:p>
             <a:fld id="{8837BD83-C95D-452A-8A03-A9CBA33557B0}" type="datetimeFigureOut">
               <a:rPr lang="en-GB" smtClean="0"/>
-              <a:t>07/08/2022</a:t>
+              <a:t>08/08/2022</a:t>
             </a:fld>
             <a:endParaRPr lang="en-GB"/>
           </a:p>
@@ -2412,7 +2415,7 @@
           <a:p>
             <a:fld id="{8837BD83-C95D-452A-8A03-A9CBA33557B0}" type="datetimeFigureOut">
               <a:rPr lang="en-GB" smtClean="0"/>
-              <a:t>07/08/2022</a:t>
+              <a:t>08/08/2022</a:t>
             </a:fld>
             <a:endParaRPr lang="en-GB"/>
           </a:p>
@@ -2701,7 +2704,7 @@
           <a:p>
             <a:fld id="{8837BD83-C95D-452A-8A03-A9CBA33557B0}" type="datetimeFigureOut">
               <a:rPr lang="en-GB" smtClean="0"/>
-              <a:t>07/08/2022</a:t>
+              <a:t>08/08/2022</a:t>
             </a:fld>
             <a:endParaRPr lang="en-GB"/>
           </a:p>
@@ -2944,7 +2947,7 @@
           <a:p>
             <a:fld id="{8837BD83-C95D-452A-8A03-A9CBA33557B0}" type="datetimeFigureOut">
               <a:rPr lang="en-GB" smtClean="0"/>
-              <a:t>07/08/2022</a:t>
+              <a:t>08/08/2022</a:t>
             </a:fld>
             <a:endParaRPr lang="en-GB"/>
           </a:p>
@@ -3423,6 +3426,71 @@
       </p:grpSpPr>
       <p:pic>
         <p:nvPicPr>
+          <p:cNvPr id="3" name="Picture 2">
+            <a:extLst>
+              <a:ext uri="{FF2B5EF4-FFF2-40B4-BE49-F238E27FC236}">
+                <a16:creationId xmlns:a16="http://schemas.microsoft.com/office/drawing/2014/main" id="{1AE380AA-09DB-412B-8C99-7371222B24C4}"/>
+              </a:ext>
+            </a:extLst>
+          </p:cNvPr>
+          <p:cNvPicPr>
+            <a:picLocks noChangeAspect="1"/>
+          </p:cNvPicPr>
+          <p:nvPr/>
+        </p:nvPicPr>
+        <p:blipFill rotWithShape="1">
+          <a:blip r:embed="rId2">
+            <a:extLst>
+              <a:ext uri="{28A0092B-C50C-407E-A947-70E740481C1C}">
+                <a14:useLocalDpi xmlns:a14="http://schemas.microsoft.com/office/drawing/2010/main" val="0"/>
+              </a:ext>
+            </a:extLst>
+          </a:blip>
+          <a:srcRect t="52849" b="1"/>
+          <a:stretch/>
+        </p:blipFill>
+        <p:spPr>
+          <a:xfrm>
+            <a:off x="972937" y="1013461"/>
+            <a:ext cx="10246125" cy="4831078"/>
+          </a:xfrm>
+          <a:prstGeom prst="rect">
+            <a:avLst/>
+          </a:prstGeom>
+        </p:spPr>
+      </p:pic>
+    </p:spTree>
+    <p:extLst>
+      <p:ext uri="{BB962C8B-B14F-4D97-AF65-F5344CB8AC3E}">
+        <p14:creationId xmlns:p14="http://schemas.microsoft.com/office/powerpoint/2010/main" val="720631105"/>
+      </p:ext>
+    </p:extLst>
+  </p:cSld>
+  <p:clrMapOvr>
+    <a:masterClrMapping/>
+  </p:clrMapOvr>
+</p:sld>
+</file>
+
+<file path=ppt/slides/slide3.xml><?xml version="1.0" encoding="utf-8"?>
+<p:sld xmlns:a="http://schemas.openxmlformats.org/drawingml/2006/main" xmlns:r="http://schemas.openxmlformats.org/officeDocument/2006/relationships" xmlns:p="http://schemas.openxmlformats.org/presentationml/2006/main">
+  <p:cSld>
+    <p:spTree>
+      <p:nvGrpSpPr>
+        <p:cNvPr id="1" name=""/>
+        <p:cNvGrpSpPr/>
+        <p:nvPr/>
+      </p:nvGrpSpPr>
+      <p:grpSpPr>
+        <a:xfrm>
+          <a:off x="0" y="0"/>
+          <a:ext cx="0" cy="0"/>
+          <a:chOff x="0" y="0"/>
+          <a:chExt cx="0" cy="0"/>
+        </a:xfrm>
+      </p:grpSpPr>
+      <p:pic>
+        <p:nvPicPr>
           <p:cNvPr id="2" name="Picture 1">
             <a:extLst>
               <a:ext uri="{FF2B5EF4-FFF2-40B4-BE49-F238E27FC236}">
@@ -4936,7 +5004,7 @@
 </p:sld>
 </file>
 
-<file path=ppt/slides/slide3.xml><?xml version="1.0" encoding="utf-8"?>
+<file path=ppt/slides/slide4.xml><?xml version="1.0" encoding="utf-8"?>
 <p:sld xmlns:a="http://schemas.openxmlformats.org/drawingml/2006/main" xmlns:r="http://schemas.openxmlformats.org/officeDocument/2006/relationships" xmlns:p="http://schemas.openxmlformats.org/presentationml/2006/main">
   <p:cSld>
     <p:spTree>
@@ -11255,7 +11323,7 @@
 </p:sld>
 </file>
 
-<file path=ppt/slides/slide4.xml><?xml version="1.0" encoding="utf-8"?>
+<file path=ppt/slides/slide5.xml><?xml version="1.0" encoding="utf-8"?>
 <p:sld xmlns:a="http://schemas.openxmlformats.org/drawingml/2006/main" xmlns:r="http://schemas.openxmlformats.org/officeDocument/2006/relationships" xmlns:p="http://schemas.openxmlformats.org/presentationml/2006/main">
   <p:cSld>
     <p:spTree>
@@ -13100,6 +13168,707 @@
     <p:extLst>
       <p:ext uri="{BB962C8B-B14F-4D97-AF65-F5344CB8AC3E}">
         <p14:creationId xmlns:p14="http://schemas.microsoft.com/office/powerpoint/2010/main" val="533227737"/>
+      </p:ext>
+    </p:extLst>
+  </p:cSld>
+  <p:clrMapOvr>
+    <a:masterClrMapping/>
+  </p:clrMapOvr>
+</p:sld>
+</file>
+
+<file path=ppt/slides/slide6.xml><?xml version="1.0" encoding="utf-8"?>
+<p:sld xmlns:a="http://schemas.openxmlformats.org/drawingml/2006/main" xmlns:r="http://schemas.openxmlformats.org/officeDocument/2006/relationships" xmlns:p="http://schemas.openxmlformats.org/presentationml/2006/main">
+  <p:cSld>
+    <p:spTree>
+      <p:nvGrpSpPr>
+        <p:cNvPr id="1" name=""/>
+        <p:cNvGrpSpPr/>
+        <p:nvPr/>
+      </p:nvGrpSpPr>
+      <p:grpSpPr>
+        <a:xfrm>
+          <a:off x="0" y="0"/>
+          <a:ext cx="0" cy="0"/>
+          <a:chOff x="0" y="0"/>
+          <a:chExt cx="0" cy="0"/>
+        </a:xfrm>
+      </p:grpSpPr>
+      <p:pic>
+        <p:nvPicPr>
+          <p:cNvPr id="3" name="Picture 2">
+            <a:extLst>
+              <a:ext uri="{FF2B5EF4-FFF2-40B4-BE49-F238E27FC236}">
+                <a16:creationId xmlns:a16="http://schemas.microsoft.com/office/drawing/2014/main" id="{E0C696AD-0E89-4729-A420-B2FB77F80632}"/>
+              </a:ext>
+            </a:extLst>
+          </p:cNvPr>
+          <p:cNvPicPr>
+            <a:picLocks noChangeAspect="1"/>
+          </p:cNvPicPr>
+          <p:nvPr/>
+        </p:nvPicPr>
+        <p:blipFill>
+          <a:blip r:embed="rId2"/>
+          <a:stretch>
+            <a:fillRect/>
+          </a:stretch>
+        </p:blipFill>
+        <p:spPr>
+          <a:xfrm>
+            <a:off x="210224" y="534473"/>
+            <a:ext cx="5055367" cy="2675701"/>
+          </a:xfrm>
+          <a:prstGeom prst="rect">
+            <a:avLst/>
+          </a:prstGeom>
+        </p:spPr>
+      </p:pic>
+      <p:pic>
+        <p:nvPicPr>
+          <p:cNvPr id="4" name="Picture 3">
+            <a:extLst>
+              <a:ext uri="{FF2B5EF4-FFF2-40B4-BE49-F238E27FC236}">
+                <a16:creationId xmlns:a16="http://schemas.microsoft.com/office/drawing/2014/main" id="{B072BDCB-C078-41FA-B2C2-04EC3C16A177}"/>
+              </a:ext>
+            </a:extLst>
+          </p:cNvPr>
+          <p:cNvPicPr>
+            <a:picLocks noChangeAspect="1"/>
+          </p:cNvPicPr>
+          <p:nvPr/>
+        </p:nvPicPr>
+        <p:blipFill>
+          <a:blip r:embed="rId3"/>
+          <a:stretch>
+            <a:fillRect/>
+          </a:stretch>
+        </p:blipFill>
+        <p:spPr>
+          <a:xfrm>
+            <a:off x="5320141" y="629159"/>
+            <a:ext cx="6784772" cy="2556000"/>
+          </a:xfrm>
+          <a:prstGeom prst="rect">
+            <a:avLst/>
+          </a:prstGeom>
+        </p:spPr>
+      </p:pic>
+      <p:pic>
+        <p:nvPicPr>
+          <p:cNvPr id="18" name="Picture 17">
+            <a:extLst>
+              <a:ext uri="{FF2B5EF4-FFF2-40B4-BE49-F238E27FC236}">
+                <a16:creationId xmlns:a16="http://schemas.microsoft.com/office/drawing/2014/main" id="{CE122D5E-CEB1-47CA-90CC-61F4A3C6DB32}"/>
+              </a:ext>
+            </a:extLst>
+          </p:cNvPr>
+          <p:cNvPicPr>
+            <a:picLocks noChangeAspect="1"/>
+          </p:cNvPicPr>
+          <p:nvPr/>
+        </p:nvPicPr>
+        <p:blipFill>
+          <a:blip r:embed="rId3"/>
+          <a:stretch>
+            <a:fillRect/>
+          </a:stretch>
+        </p:blipFill>
+        <p:spPr>
+          <a:xfrm>
+            <a:off x="5320141" y="3429000"/>
+            <a:ext cx="6784772" cy="2556000"/>
+          </a:xfrm>
+          <a:prstGeom prst="rect">
+            <a:avLst/>
+          </a:prstGeom>
+        </p:spPr>
+      </p:pic>
+      <p:sp>
+        <p:nvSpPr>
+          <p:cNvPr id="19" name="Oval 18">
+            <a:extLst>
+              <a:ext uri="{FF2B5EF4-FFF2-40B4-BE49-F238E27FC236}">
+                <a16:creationId xmlns:a16="http://schemas.microsoft.com/office/drawing/2014/main" id="{E5EEBB59-47FD-4F4F-BA26-C78E014F48A2}"/>
+              </a:ext>
+            </a:extLst>
+          </p:cNvPr>
+          <p:cNvSpPr>
+            <a:spLocks noChangeAspect="1"/>
+          </p:cNvSpPr>
+          <p:nvPr/>
+        </p:nvSpPr>
+        <p:spPr>
+          <a:xfrm>
+            <a:off x="7463246" y="5499498"/>
+            <a:ext cx="72000" cy="72000"/>
+          </a:xfrm>
+          <a:prstGeom prst="ellipse">
+            <a:avLst/>
+          </a:prstGeom>
+          <a:ln>
+            <a:noFill/>
+          </a:ln>
+        </p:spPr>
+        <p:style>
+          <a:lnRef idx="2">
+            <a:schemeClr val="accent1">
+              <a:shade val="50000"/>
+            </a:schemeClr>
+          </a:lnRef>
+          <a:fillRef idx="1">
+            <a:schemeClr val="accent1"/>
+          </a:fillRef>
+          <a:effectRef idx="0">
+            <a:schemeClr val="accent1"/>
+          </a:effectRef>
+          <a:fontRef idx="minor">
+            <a:schemeClr val="lt1"/>
+          </a:fontRef>
+        </p:style>
+        <p:txBody>
+          <a:bodyPr rtlCol="0" anchor="ctr"/>
+          <a:lstStyle/>
+          <a:p>
+            <a:pPr algn="ctr"/>
+            <a:endParaRPr lang="en-US"/>
+          </a:p>
+        </p:txBody>
+      </p:sp>
+      <p:sp>
+        <p:nvSpPr>
+          <p:cNvPr id="20" name="Oval 19">
+            <a:extLst>
+              <a:ext uri="{FF2B5EF4-FFF2-40B4-BE49-F238E27FC236}">
+                <a16:creationId xmlns:a16="http://schemas.microsoft.com/office/drawing/2014/main" id="{B30E6F39-7C76-4E8A-B43F-3ED329660329}"/>
+              </a:ext>
+            </a:extLst>
+          </p:cNvPr>
+          <p:cNvSpPr>
+            <a:spLocks noChangeAspect="1"/>
+          </p:cNvSpPr>
+          <p:nvPr/>
+        </p:nvSpPr>
+        <p:spPr>
+          <a:xfrm>
+            <a:off x="7266078" y="5264367"/>
+            <a:ext cx="72000" cy="72000"/>
+          </a:xfrm>
+          <a:prstGeom prst="ellipse">
+            <a:avLst/>
+          </a:prstGeom>
+          <a:ln>
+            <a:noFill/>
+          </a:ln>
+        </p:spPr>
+        <p:style>
+          <a:lnRef idx="2">
+            <a:schemeClr val="accent1">
+              <a:shade val="50000"/>
+            </a:schemeClr>
+          </a:lnRef>
+          <a:fillRef idx="1">
+            <a:schemeClr val="accent1"/>
+          </a:fillRef>
+          <a:effectRef idx="0">
+            <a:schemeClr val="accent1"/>
+          </a:effectRef>
+          <a:fontRef idx="minor">
+            <a:schemeClr val="lt1"/>
+          </a:fontRef>
+        </p:style>
+        <p:txBody>
+          <a:bodyPr rtlCol="0" anchor="ctr"/>
+          <a:lstStyle/>
+          <a:p>
+            <a:pPr algn="ctr"/>
+            <a:endParaRPr lang="en-US"/>
+          </a:p>
+        </p:txBody>
+      </p:sp>
+      <p:sp>
+        <p:nvSpPr>
+          <p:cNvPr id="21" name="Oval 20">
+            <a:extLst>
+              <a:ext uri="{FF2B5EF4-FFF2-40B4-BE49-F238E27FC236}">
+                <a16:creationId xmlns:a16="http://schemas.microsoft.com/office/drawing/2014/main" id="{7EA60A8C-F927-4A15-987F-C5E901D2E14F}"/>
+              </a:ext>
+            </a:extLst>
+          </p:cNvPr>
+          <p:cNvSpPr>
+            <a:spLocks noChangeAspect="1"/>
+          </p:cNvSpPr>
+          <p:nvPr/>
+        </p:nvSpPr>
+        <p:spPr>
+          <a:xfrm>
+            <a:off x="7160079" y="5163792"/>
+            <a:ext cx="72000" cy="72000"/>
+          </a:xfrm>
+          <a:prstGeom prst="ellipse">
+            <a:avLst/>
+          </a:prstGeom>
+          <a:ln>
+            <a:noFill/>
+          </a:ln>
+        </p:spPr>
+        <p:style>
+          <a:lnRef idx="2">
+            <a:schemeClr val="accent1">
+              <a:shade val="50000"/>
+            </a:schemeClr>
+          </a:lnRef>
+          <a:fillRef idx="1">
+            <a:schemeClr val="accent1"/>
+          </a:fillRef>
+          <a:effectRef idx="0">
+            <a:schemeClr val="accent1"/>
+          </a:effectRef>
+          <a:fontRef idx="minor">
+            <a:schemeClr val="lt1"/>
+          </a:fontRef>
+        </p:style>
+        <p:txBody>
+          <a:bodyPr rtlCol="0" anchor="ctr"/>
+          <a:lstStyle/>
+          <a:p>
+            <a:pPr algn="ctr"/>
+            <a:endParaRPr lang="en-US"/>
+          </a:p>
+        </p:txBody>
+      </p:sp>
+      <p:sp>
+        <p:nvSpPr>
+          <p:cNvPr id="22" name="Oval 21">
+            <a:extLst>
+              <a:ext uri="{FF2B5EF4-FFF2-40B4-BE49-F238E27FC236}">
+                <a16:creationId xmlns:a16="http://schemas.microsoft.com/office/drawing/2014/main" id="{8D12C415-628B-4A2B-98E1-8CEDDC2F0A61}"/>
+              </a:ext>
+            </a:extLst>
+          </p:cNvPr>
+          <p:cNvSpPr>
+            <a:spLocks noChangeAspect="1"/>
+          </p:cNvSpPr>
+          <p:nvPr/>
+        </p:nvSpPr>
+        <p:spPr>
+          <a:xfrm>
+            <a:off x="6933189" y="4964176"/>
+            <a:ext cx="72000" cy="72000"/>
+          </a:xfrm>
+          <a:prstGeom prst="ellipse">
+            <a:avLst/>
+          </a:prstGeom>
+          <a:ln>
+            <a:noFill/>
+          </a:ln>
+        </p:spPr>
+        <p:style>
+          <a:lnRef idx="2">
+            <a:schemeClr val="accent1">
+              <a:shade val="50000"/>
+            </a:schemeClr>
+          </a:lnRef>
+          <a:fillRef idx="1">
+            <a:schemeClr val="accent1"/>
+          </a:fillRef>
+          <a:effectRef idx="0">
+            <a:schemeClr val="accent1"/>
+          </a:effectRef>
+          <a:fontRef idx="minor">
+            <a:schemeClr val="lt1"/>
+          </a:fontRef>
+        </p:style>
+        <p:txBody>
+          <a:bodyPr rtlCol="0" anchor="ctr"/>
+          <a:lstStyle/>
+          <a:p>
+            <a:pPr algn="ctr"/>
+            <a:endParaRPr lang="en-US"/>
+          </a:p>
+        </p:txBody>
+      </p:sp>
+      <p:sp>
+        <p:nvSpPr>
+          <p:cNvPr id="23" name="Oval 22">
+            <a:extLst>
+              <a:ext uri="{FF2B5EF4-FFF2-40B4-BE49-F238E27FC236}">
+                <a16:creationId xmlns:a16="http://schemas.microsoft.com/office/drawing/2014/main" id="{98B64643-199D-46B3-A48E-9692CE7A52A4}"/>
+              </a:ext>
+            </a:extLst>
+          </p:cNvPr>
+          <p:cNvSpPr>
+            <a:spLocks noChangeAspect="1"/>
+          </p:cNvSpPr>
+          <p:nvPr/>
+        </p:nvSpPr>
+        <p:spPr>
+          <a:xfrm>
+            <a:off x="6840258" y="4892176"/>
+            <a:ext cx="72000" cy="72000"/>
+          </a:xfrm>
+          <a:prstGeom prst="ellipse">
+            <a:avLst/>
+          </a:prstGeom>
+          <a:ln>
+            <a:noFill/>
+          </a:ln>
+        </p:spPr>
+        <p:style>
+          <a:lnRef idx="2">
+            <a:schemeClr val="accent1">
+              <a:shade val="50000"/>
+            </a:schemeClr>
+          </a:lnRef>
+          <a:fillRef idx="1">
+            <a:schemeClr val="accent1"/>
+          </a:fillRef>
+          <a:effectRef idx="0">
+            <a:schemeClr val="accent1"/>
+          </a:effectRef>
+          <a:fontRef idx="minor">
+            <a:schemeClr val="lt1"/>
+          </a:fontRef>
+        </p:style>
+        <p:txBody>
+          <a:bodyPr rtlCol="0" anchor="ctr"/>
+          <a:lstStyle/>
+          <a:p>
+            <a:pPr algn="ctr"/>
+            <a:endParaRPr lang="en-US"/>
+          </a:p>
+        </p:txBody>
+      </p:sp>
+      <p:sp>
+        <p:nvSpPr>
+          <p:cNvPr id="24" name="Oval 23">
+            <a:extLst>
+              <a:ext uri="{FF2B5EF4-FFF2-40B4-BE49-F238E27FC236}">
+                <a16:creationId xmlns:a16="http://schemas.microsoft.com/office/drawing/2014/main" id="{F671BDBE-CE19-4FEA-ABBF-E01E317B048B}"/>
+              </a:ext>
+            </a:extLst>
+          </p:cNvPr>
+          <p:cNvSpPr>
+            <a:spLocks noChangeAspect="1"/>
+          </p:cNvSpPr>
+          <p:nvPr/>
+        </p:nvSpPr>
+        <p:spPr>
+          <a:xfrm>
+            <a:off x="6513890" y="4600164"/>
+            <a:ext cx="72000" cy="72000"/>
+          </a:xfrm>
+          <a:prstGeom prst="ellipse">
+            <a:avLst/>
+          </a:prstGeom>
+          <a:ln>
+            <a:noFill/>
+          </a:ln>
+        </p:spPr>
+        <p:style>
+          <a:lnRef idx="2">
+            <a:schemeClr val="accent1">
+              <a:shade val="50000"/>
+            </a:schemeClr>
+          </a:lnRef>
+          <a:fillRef idx="1">
+            <a:schemeClr val="accent1"/>
+          </a:fillRef>
+          <a:effectRef idx="0">
+            <a:schemeClr val="accent1"/>
+          </a:effectRef>
+          <a:fontRef idx="minor">
+            <a:schemeClr val="lt1"/>
+          </a:fontRef>
+        </p:style>
+        <p:txBody>
+          <a:bodyPr rtlCol="0" anchor="ctr"/>
+          <a:lstStyle/>
+          <a:p>
+            <a:pPr algn="ctr"/>
+            <a:endParaRPr lang="en-US"/>
+          </a:p>
+        </p:txBody>
+      </p:sp>
+      <p:sp>
+        <p:nvSpPr>
+          <p:cNvPr id="25" name="Oval 24">
+            <a:extLst>
+              <a:ext uri="{FF2B5EF4-FFF2-40B4-BE49-F238E27FC236}">
+                <a16:creationId xmlns:a16="http://schemas.microsoft.com/office/drawing/2014/main" id="{7FDE9A44-E686-4664-A00A-68C435757448}"/>
+              </a:ext>
+            </a:extLst>
+          </p:cNvPr>
+          <p:cNvSpPr>
+            <a:spLocks noChangeAspect="1"/>
+          </p:cNvSpPr>
+          <p:nvPr/>
+        </p:nvSpPr>
+        <p:spPr>
+          <a:xfrm>
+            <a:off x="6170990" y="4359658"/>
+            <a:ext cx="72000" cy="72000"/>
+          </a:xfrm>
+          <a:prstGeom prst="ellipse">
+            <a:avLst/>
+          </a:prstGeom>
+          <a:ln>
+            <a:noFill/>
+          </a:ln>
+        </p:spPr>
+        <p:style>
+          <a:lnRef idx="2">
+            <a:schemeClr val="accent1">
+              <a:shade val="50000"/>
+            </a:schemeClr>
+          </a:lnRef>
+          <a:fillRef idx="1">
+            <a:schemeClr val="accent1"/>
+          </a:fillRef>
+          <a:effectRef idx="0">
+            <a:schemeClr val="accent1"/>
+          </a:effectRef>
+          <a:fontRef idx="minor">
+            <a:schemeClr val="lt1"/>
+          </a:fontRef>
+        </p:style>
+        <p:txBody>
+          <a:bodyPr rtlCol="0" anchor="ctr"/>
+          <a:lstStyle/>
+          <a:p>
+            <a:pPr algn="ctr"/>
+            <a:endParaRPr lang="en-US"/>
+          </a:p>
+        </p:txBody>
+      </p:sp>
+      <p:sp>
+        <p:nvSpPr>
+          <p:cNvPr id="26" name="Oval 25">
+            <a:extLst>
+              <a:ext uri="{FF2B5EF4-FFF2-40B4-BE49-F238E27FC236}">
+                <a16:creationId xmlns:a16="http://schemas.microsoft.com/office/drawing/2014/main" id="{1E4D0A21-55BB-4809-B8B0-DBC37B4561E7}"/>
+              </a:ext>
+            </a:extLst>
+          </p:cNvPr>
+          <p:cNvSpPr>
+            <a:spLocks noChangeAspect="1"/>
+          </p:cNvSpPr>
+          <p:nvPr/>
+        </p:nvSpPr>
+        <p:spPr>
+          <a:xfrm>
+            <a:off x="6064762" y="4271551"/>
+            <a:ext cx="72000" cy="72000"/>
+          </a:xfrm>
+          <a:prstGeom prst="ellipse">
+            <a:avLst/>
+          </a:prstGeom>
+          <a:ln>
+            <a:noFill/>
+          </a:ln>
+        </p:spPr>
+        <p:style>
+          <a:lnRef idx="2">
+            <a:schemeClr val="accent1">
+              <a:shade val="50000"/>
+            </a:schemeClr>
+          </a:lnRef>
+          <a:fillRef idx="1">
+            <a:schemeClr val="accent1"/>
+          </a:fillRef>
+          <a:effectRef idx="0">
+            <a:schemeClr val="accent1"/>
+          </a:effectRef>
+          <a:fontRef idx="minor">
+            <a:schemeClr val="lt1"/>
+          </a:fontRef>
+        </p:style>
+        <p:txBody>
+          <a:bodyPr rtlCol="0" anchor="ctr"/>
+          <a:lstStyle/>
+          <a:p>
+            <a:pPr algn="ctr"/>
+            <a:endParaRPr lang="en-US"/>
+          </a:p>
+        </p:txBody>
+      </p:sp>
+      <p:sp>
+        <p:nvSpPr>
+          <p:cNvPr id="27" name="Freeform: Shape 26">
+            <a:extLst>
+              <a:ext uri="{FF2B5EF4-FFF2-40B4-BE49-F238E27FC236}">
+                <a16:creationId xmlns:a16="http://schemas.microsoft.com/office/drawing/2014/main" id="{D6BFD26E-3B9E-4107-9708-EEED99B2F2C7}"/>
+              </a:ext>
+            </a:extLst>
+          </p:cNvPr>
+          <p:cNvSpPr/>
+          <p:nvPr/>
+        </p:nvSpPr>
+        <p:spPr>
+          <a:xfrm>
+            <a:off x="6096000" y="4307172"/>
+            <a:ext cx="1526381" cy="1321594"/>
+          </a:xfrm>
+          <a:custGeom>
+            <a:avLst/>
+            <a:gdLst>
+              <a:gd name="connsiteX0" fmla="*/ 0 w 1526381"/>
+              <a:gd name="connsiteY0" fmla="*/ 0 h 1321594"/>
+              <a:gd name="connsiteX1" fmla="*/ 109538 w 1526381"/>
+              <a:gd name="connsiteY1" fmla="*/ 90488 h 1321594"/>
+              <a:gd name="connsiteX2" fmla="*/ 457200 w 1526381"/>
+              <a:gd name="connsiteY2" fmla="*/ 328613 h 1321594"/>
+              <a:gd name="connsiteX3" fmla="*/ 781050 w 1526381"/>
+              <a:gd name="connsiteY3" fmla="*/ 623888 h 1321594"/>
+              <a:gd name="connsiteX4" fmla="*/ 876300 w 1526381"/>
+              <a:gd name="connsiteY4" fmla="*/ 697707 h 1321594"/>
+              <a:gd name="connsiteX5" fmla="*/ 1100138 w 1526381"/>
+              <a:gd name="connsiteY5" fmla="*/ 895350 h 1321594"/>
+              <a:gd name="connsiteX6" fmla="*/ 1212056 w 1526381"/>
+              <a:gd name="connsiteY6" fmla="*/ 1000125 h 1321594"/>
+              <a:gd name="connsiteX7" fmla="*/ 1409700 w 1526381"/>
+              <a:gd name="connsiteY7" fmla="*/ 1233488 h 1321594"/>
+              <a:gd name="connsiteX8" fmla="*/ 1526381 w 1526381"/>
+              <a:gd name="connsiteY8" fmla="*/ 1321594 h 1321594"/>
+            </a:gdLst>
+            <a:ahLst/>
+            <a:cxnLst>
+              <a:cxn ang="0">
+                <a:pos x="connsiteX0" y="connsiteY0"/>
+              </a:cxn>
+              <a:cxn ang="0">
+                <a:pos x="connsiteX1" y="connsiteY1"/>
+              </a:cxn>
+              <a:cxn ang="0">
+                <a:pos x="connsiteX2" y="connsiteY2"/>
+              </a:cxn>
+              <a:cxn ang="0">
+                <a:pos x="connsiteX3" y="connsiteY3"/>
+              </a:cxn>
+              <a:cxn ang="0">
+                <a:pos x="connsiteX4" y="connsiteY4"/>
+              </a:cxn>
+              <a:cxn ang="0">
+                <a:pos x="connsiteX5" y="connsiteY5"/>
+              </a:cxn>
+              <a:cxn ang="0">
+                <a:pos x="connsiteX6" y="connsiteY6"/>
+              </a:cxn>
+              <a:cxn ang="0">
+                <a:pos x="connsiteX7" y="connsiteY7"/>
+              </a:cxn>
+              <a:cxn ang="0">
+                <a:pos x="connsiteX8" y="connsiteY8"/>
+              </a:cxn>
+            </a:cxnLst>
+            <a:rect l="l" t="t" r="r" b="b"/>
+            <a:pathLst>
+              <a:path w="1526381" h="1321594">
+                <a:moveTo>
+                  <a:pt x="0" y="0"/>
+                </a:moveTo>
+                <a:cubicBezTo>
+                  <a:pt x="16669" y="17859"/>
+                  <a:pt x="33338" y="35719"/>
+                  <a:pt x="109538" y="90488"/>
+                </a:cubicBezTo>
+                <a:cubicBezTo>
+                  <a:pt x="185738" y="145257"/>
+                  <a:pt x="345281" y="239713"/>
+                  <a:pt x="457200" y="328613"/>
+                </a:cubicBezTo>
+                <a:cubicBezTo>
+                  <a:pt x="569119" y="417513"/>
+                  <a:pt x="711200" y="562372"/>
+                  <a:pt x="781050" y="623888"/>
+                </a:cubicBezTo>
+                <a:cubicBezTo>
+                  <a:pt x="850900" y="685404"/>
+                  <a:pt x="823119" y="652463"/>
+                  <a:pt x="876300" y="697707"/>
+                </a:cubicBezTo>
+                <a:cubicBezTo>
+                  <a:pt x="929481" y="742951"/>
+                  <a:pt x="1044179" y="844947"/>
+                  <a:pt x="1100138" y="895350"/>
+                </a:cubicBezTo>
+                <a:cubicBezTo>
+                  <a:pt x="1156097" y="945753"/>
+                  <a:pt x="1160462" y="943769"/>
+                  <a:pt x="1212056" y="1000125"/>
+                </a:cubicBezTo>
+                <a:cubicBezTo>
+                  <a:pt x="1263650" y="1056481"/>
+                  <a:pt x="1357312" y="1179910"/>
+                  <a:pt x="1409700" y="1233488"/>
+                </a:cubicBezTo>
+                <a:cubicBezTo>
+                  <a:pt x="1462088" y="1287066"/>
+                  <a:pt x="1494234" y="1304330"/>
+                  <a:pt x="1526381" y="1321594"/>
+                </a:cubicBezTo>
+              </a:path>
+            </a:pathLst>
+          </a:custGeom>
+          <a:ln w="19050"/>
+        </p:spPr>
+        <p:style>
+          <a:lnRef idx="1">
+            <a:schemeClr val="accent2"/>
+          </a:lnRef>
+          <a:fillRef idx="0">
+            <a:schemeClr val="accent2"/>
+          </a:fillRef>
+          <a:effectRef idx="0">
+            <a:schemeClr val="accent2"/>
+          </a:effectRef>
+          <a:fontRef idx="minor">
+            <a:schemeClr val="tx1"/>
+          </a:fontRef>
+        </p:style>
+        <p:txBody>
+          <a:bodyPr rtlCol="0" anchor="ctr"/>
+          <a:lstStyle/>
+          <a:p>
+            <a:pPr algn="ctr"/>
+            <a:endParaRPr lang="en-US"/>
+          </a:p>
+        </p:txBody>
+      </p:sp>
+    </p:spTree>
+    <p:extLst>
+      <p:ext uri="{BB962C8B-B14F-4D97-AF65-F5344CB8AC3E}">
+        <p14:creationId xmlns:p14="http://schemas.microsoft.com/office/powerpoint/2010/main" val="375635390"/>
+      </p:ext>
+    </p:extLst>
+  </p:cSld>
+  <p:clrMapOvr>
+    <a:masterClrMapping/>
+  </p:clrMapOvr>
+</p:sld>
+</file>
+
+<file path=ppt/slides/slide7.xml><?xml version="1.0" encoding="utf-8"?>
+<p:sld xmlns:a="http://schemas.openxmlformats.org/drawingml/2006/main" xmlns:r="http://schemas.openxmlformats.org/officeDocument/2006/relationships" xmlns:p="http://schemas.openxmlformats.org/presentationml/2006/main">
+  <p:cSld>
+    <p:spTree>
+      <p:nvGrpSpPr>
+        <p:cNvPr id="1" name=""/>
+        <p:cNvGrpSpPr/>
+        <p:nvPr/>
+      </p:nvGrpSpPr>
+      <p:grpSpPr>
+        <a:xfrm>
+          <a:off x="0" y="0"/>
+          <a:ext cx="0" cy="0"/>
+          <a:chOff x="0" y="0"/>
+          <a:chExt cx="0" cy="0"/>
+        </a:xfrm>
+      </p:grpSpPr>
+    </p:spTree>
+    <p:extLst>
+      <p:ext uri="{BB962C8B-B14F-4D97-AF65-F5344CB8AC3E}">
+        <p14:creationId xmlns:p14="http://schemas.microsoft.com/office/powerpoint/2010/main" val="3218597126"/>
       </p:ext>
     </p:extLst>
   </p:cSld>

</xml_diff>

<commit_message>
find a big problem in grad v
</commit_message>
<xml_diff>
--- a/data/draft.pptx
+++ b/data/draft.pptx
@@ -11,7 +11,8 @@
     <p:sldId id="259" r:id="rId5"/>
     <p:sldId id="260" r:id="rId6"/>
     <p:sldId id="262" r:id="rId7"/>
-    <p:sldId id="263" r:id="rId8"/>
+    <p:sldId id="264" r:id="rId8"/>
+    <p:sldId id="263" r:id="rId9"/>
   </p:sldIdLst>
   <p:sldSz cx="12192000" cy="6858000"/>
   <p:notesSz cx="6797675" cy="9926638"/>
@@ -278,7 +279,7 @@
           <a:p>
             <a:fld id="{8837BD83-C95D-452A-8A03-A9CBA33557B0}" type="datetimeFigureOut">
               <a:rPr lang="en-GB" smtClean="0"/>
-              <a:t>08/08/2022</a:t>
+              <a:t>12/09/2022</a:t>
             </a:fld>
             <a:endParaRPr lang="en-GB"/>
           </a:p>
@@ -478,7 +479,7 @@
           <a:p>
             <a:fld id="{8837BD83-C95D-452A-8A03-A9CBA33557B0}" type="datetimeFigureOut">
               <a:rPr lang="en-GB" smtClean="0"/>
-              <a:t>08/08/2022</a:t>
+              <a:t>12/09/2022</a:t>
             </a:fld>
             <a:endParaRPr lang="en-GB"/>
           </a:p>
@@ -688,7 +689,7 @@
           <a:p>
             <a:fld id="{8837BD83-C95D-452A-8A03-A9CBA33557B0}" type="datetimeFigureOut">
               <a:rPr lang="en-GB" smtClean="0"/>
-              <a:t>08/08/2022</a:t>
+              <a:t>12/09/2022</a:t>
             </a:fld>
             <a:endParaRPr lang="en-GB"/>
           </a:p>
@@ -888,7 +889,7 @@
           <a:p>
             <a:fld id="{8837BD83-C95D-452A-8A03-A9CBA33557B0}" type="datetimeFigureOut">
               <a:rPr lang="en-GB" smtClean="0"/>
-              <a:t>08/08/2022</a:t>
+              <a:t>12/09/2022</a:t>
             </a:fld>
             <a:endParaRPr lang="en-GB"/>
           </a:p>
@@ -1164,7 +1165,7 @@
           <a:p>
             <a:fld id="{8837BD83-C95D-452A-8A03-A9CBA33557B0}" type="datetimeFigureOut">
               <a:rPr lang="en-GB" smtClean="0"/>
-              <a:t>08/08/2022</a:t>
+              <a:t>12/09/2022</a:t>
             </a:fld>
             <a:endParaRPr lang="en-GB"/>
           </a:p>
@@ -1432,7 +1433,7 @@
           <a:p>
             <a:fld id="{8837BD83-C95D-452A-8A03-A9CBA33557B0}" type="datetimeFigureOut">
               <a:rPr lang="en-GB" smtClean="0"/>
-              <a:t>08/08/2022</a:t>
+              <a:t>12/09/2022</a:t>
             </a:fld>
             <a:endParaRPr lang="en-GB"/>
           </a:p>
@@ -1847,7 +1848,7 @@
           <a:p>
             <a:fld id="{8837BD83-C95D-452A-8A03-A9CBA33557B0}" type="datetimeFigureOut">
               <a:rPr lang="en-GB" smtClean="0"/>
-              <a:t>08/08/2022</a:t>
+              <a:t>12/09/2022</a:t>
             </a:fld>
             <a:endParaRPr lang="en-GB"/>
           </a:p>
@@ -1989,7 +1990,7 @@
           <a:p>
             <a:fld id="{8837BD83-C95D-452A-8A03-A9CBA33557B0}" type="datetimeFigureOut">
               <a:rPr lang="en-GB" smtClean="0"/>
-              <a:t>08/08/2022</a:t>
+              <a:t>12/09/2022</a:t>
             </a:fld>
             <a:endParaRPr lang="en-GB"/>
           </a:p>
@@ -2102,7 +2103,7 @@
           <a:p>
             <a:fld id="{8837BD83-C95D-452A-8A03-A9CBA33557B0}" type="datetimeFigureOut">
               <a:rPr lang="en-GB" smtClean="0"/>
-              <a:t>08/08/2022</a:t>
+              <a:t>12/09/2022</a:t>
             </a:fld>
             <a:endParaRPr lang="en-GB"/>
           </a:p>
@@ -2415,7 +2416,7 @@
           <a:p>
             <a:fld id="{8837BD83-C95D-452A-8A03-A9CBA33557B0}" type="datetimeFigureOut">
               <a:rPr lang="en-GB" smtClean="0"/>
-              <a:t>08/08/2022</a:t>
+              <a:t>12/09/2022</a:t>
             </a:fld>
             <a:endParaRPr lang="en-GB"/>
           </a:p>
@@ -2704,7 +2705,7 @@
           <a:p>
             <a:fld id="{8837BD83-C95D-452A-8A03-A9CBA33557B0}" type="datetimeFigureOut">
               <a:rPr lang="en-GB" smtClean="0"/>
-              <a:t>08/08/2022</a:t>
+              <a:t>12/09/2022</a:t>
             </a:fld>
             <a:endParaRPr lang="en-GB"/>
           </a:p>
@@ -2947,7 +2948,7 @@
           <a:p>
             <a:fld id="{8837BD83-C95D-452A-8A03-A9CBA33557B0}" type="datetimeFigureOut">
               <a:rPr lang="en-GB" smtClean="0"/>
-              <a:t>08/08/2022</a:t>
+              <a:t>12/09/2022</a:t>
             </a:fld>
             <a:endParaRPr lang="en-GB"/>
           </a:p>
@@ -13865,6 +13866,1423 @@
           <a:chExt cx="0" cy="0"/>
         </a:xfrm>
       </p:grpSpPr>
+      <p:pic>
+        <p:nvPicPr>
+          <p:cNvPr id="7" name="Picture 6">
+            <a:extLst>
+              <a:ext uri="{FF2B5EF4-FFF2-40B4-BE49-F238E27FC236}">
+                <a16:creationId xmlns:a16="http://schemas.microsoft.com/office/drawing/2014/main" id="{C58D0FF0-5F1E-1D9E-00D7-951A731FBCC1}"/>
+              </a:ext>
+            </a:extLst>
+          </p:cNvPr>
+          <p:cNvPicPr>
+            <a:picLocks noChangeAspect="1"/>
+          </p:cNvPicPr>
+          <p:nvPr/>
+        </p:nvPicPr>
+        <p:blipFill>
+          <a:blip r:embed="rId2"/>
+          <a:stretch>
+            <a:fillRect/>
+          </a:stretch>
+        </p:blipFill>
+        <p:spPr>
+          <a:xfrm>
+            <a:off x="-76613" y="1478993"/>
+            <a:ext cx="3657788" cy="3657788"/>
+          </a:xfrm>
+          <a:prstGeom prst="rect">
+            <a:avLst/>
+          </a:prstGeom>
+        </p:spPr>
+      </p:pic>
+      <p:pic>
+        <p:nvPicPr>
+          <p:cNvPr id="15" name="Picture 14">
+            <a:extLst>
+              <a:ext uri="{FF2B5EF4-FFF2-40B4-BE49-F238E27FC236}">
+                <a16:creationId xmlns:a16="http://schemas.microsoft.com/office/drawing/2014/main" id="{7FA5D3B7-5159-2663-6E80-7BE358CA3320}"/>
+              </a:ext>
+            </a:extLst>
+          </p:cNvPr>
+          <p:cNvPicPr>
+            <a:picLocks noChangeAspect="1"/>
+          </p:cNvPicPr>
+          <p:nvPr/>
+        </p:nvPicPr>
+        <p:blipFill>
+          <a:blip r:embed="rId3"/>
+          <a:stretch>
+            <a:fillRect/>
+          </a:stretch>
+        </p:blipFill>
+        <p:spPr>
+          <a:xfrm>
+            <a:off x="2374391" y="1478993"/>
+            <a:ext cx="3657788" cy="3657788"/>
+          </a:xfrm>
+          <a:prstGeom prst="rect">
+            <a:avLst/>
+          </a:prstGeom>
+        </p:spPr>
+      </p:pic>
+      <p:graphicFrame>
+        <p:nvGraphicFramePr>
+          <p:cNvPr id="2" name="Table 1">
+            <a:extLst>
+              <a:ext uri="{FF2B5EF4-FFF2-40B4-BE49-F238E27FC236}">
+                <a16:creationId xmlns:a16="http://schemas.microsoft.com/office/drawing/2014/main" id="{F9E05D45-7BCC-A5ED-72A1-38E2F8803178}"/>
+              </a:ext>
+            </a:extLst>
+          </p:cNvPr>
+          <p:cNvGraphicFramePr>
+            <a:graphicFrameLocks noGrp="1"/>
+          </p:cNvGraphicFramePr>
+          <p:nvPr/>
+        </p:nvGraphicFramePr>
+        <p:xfrm>
+          <a:off x="0" y="0"/>
+          <a:ext cx="4267200" cy="1289050"/>
+        </p:xfrm>
+        <a:graphic>
+          <a:graphicData uri="http://schemas.openxmlformats.org/drawingml/2006/table">
+            <a:tbl>
+              <a:tblPr>
+                <a:tableStyleId>{93296810-A885-4BE3-A3E7-6D5BEEA58F35}</a:tableStyleId>
+              </a:tblPr>
+              <a:tblGrid>
+                <a:gridCol w="609600">
+                  <a:extLst>
+                    <a:ext uri="{9D8B030D-6E8A-4147-A177-3AD203B41FA5}">
+                      <a16:colId xmlns:a16="http://schemas.microsoft.com/office/drawing/2014/main" val="75815607"/>
+                    </a:ext>
+                  </a:extLst>
+                </a:gridCol>
+                <a:gridCol w="609600">
+                  <a:extLst>
+                    <a:ext uri="{9D8B030D-6E8A-4147-A177-3AD203B41FA5}">
+                      <a16:colId xmlns:a16="http://schemas.microsoft.com/office/drawing/2014/main" val="1907419939"/>
+                    </a:ext>
+                  </a:extLst>
+                </a:gridCol>
+                <a:gridCol w="609600">
+                  <a:extLst>
+                    <a:ext uri="{9D8B030D-6E8A-4147-A177-3AD203B41FA5}">
+                      <a16:colId xmlns:a16="http://schemas.microsoft.com/office/drawing/2014/main" val="2219341483"/>
+                    </a:ext>
+                  </a:extLst>
+                </a:gridCol>
+                <a:gridCol w="609600">
+                  <a:extLst>
+                    <a:ext uri="{9D8B030D-6E8A-4147-A177-3AD203B41FA5}">
+                      <a16:colId xmlns:a16="http://schemas.microsoft.com/office/drawing/2014/main" val="3970234215"/>
+                    </a:ext>
+                  </a:extLst>
+                </a:gridCol>
+                <a:gridCol w="609600">
+                  <a:extLst>
+                    <a:ext uri="{9D8B030D-6E8A-4147-A177-3AD203B41FA5}">
+                      <a16:colId xmlns:a16="http://schemas.microsoft.com/office/drawing/2014/main" val="4281731642"/>
+                    </a:ext>
+                  </a:extLst>
+                </a:gridCol>
+                <a:gridCol w="609600">
+                  <a:extLst>
+                    <a:ext uri="{9D8B030D-6E8A-4147-A177-3AD203B41FA5}">
+                      <a16:colId xmlns:a16="http://schemas.microsoft.com/office/drawing/2014/main" val="3113271008"/>
+                    </a:ext>
+                  </a:extLst>
+                </a:gridCol>
+                <a:gridCol w="609600">
+                  <a:extLst>
+                    <a:ext uri="{9D8B030D-6E8A-4147-A177-3AD203B41FA5}">
+                      <a16:colId xmlns:a16="http://schemas.microsoft.com/office/drawing/2014/main" val="2478660917"/>
+                    </a:ext>
+                  </a:extLst>
+                </a:gridCol>
+              </a:tblGrid>
+              <a:tr h="184150">
+                <a:tc>
+                  <a:txBody>
+                    <a:bodyPr/>
+                    <a:lstStyle/>
+                    <a:p>
+                      <a:pPr algn="l" fontAlgn="b"/>
+                      <a:endParaRPr lang="en-GB" sz="1100" b="0" i="0" u="none" strike="noStrike">
+                        <a:solidFill>
+                          <a:srgbClr val="000000"/>
+                        </a:solidFill>
+                        <a:effectLst/>
+                        <a:latin typeface="Calibri" panose="020F0502020204030204" pitchFamily="34" charset="0"/>
+                      </a:endParaRPr>
+                    </a:p>
+                  </a:txBody>
+                  <a:tcPr marL="6350" marR="6350" marT="6350" marB="0" anchor="b"/>
+                </a:tc>
+                <a:tc>
+                  <a:txBody>
+                    <a:bodyPr/>
+                    <a:lstStyle/>
+                    <a:p>
+                      <a:pPr algn="l" fontAlgn="b"/>
+                      <a:r>
+                        <a:rPr lang="en-GB" sz="1100" u="none" strike="noStrike">
+                          <a:effectLst/>
+                        </a:rPr>
+                        <a:t>x</a:t>
+                      </a:r>
+                      <a:endParaRPr lang="en-GB" sz="1100" b="0" i="0" u="none" strike="noStrike">
+                        <a:solidFill>
+                          <a:srgbClr val="000000"/>
+                        </a:solidFill>
+                        <a:effectLst/>
+                        <a:latin typeface="Calibri" panose="020F0502020204030204" pitchFamily="34" charset="0"/>
+                      </a:endParaRPr>
+                    </a:p>
+                  </a:txBody>
+                  <a:tcPr marL="6350" marR="6350" marT="6350" marB="0" anchor="b"/>
+                </a:tc>
+                <a:tc>
+                  <a:txBody>
+                    <a:bodyPr/>
+                    <a:lstStyle/>
+                    <a:p>
+                      <a:pPr algn="l" fontAlgn="b"/>
+                      <a:r>
+                        <a:rPr lang="en-GB" sz="1100" u="none" strike="noStrike">
+                          <a:effectLst/>
+                        </a:rPr>
+                        <a:t>y</a:t>
+                      </a:r>
+                      <a:endParaRPr lang="en-GB" sz="1100" b="0" i="0" u="none" strike="noStrike">
+                        <a:solidFill>
+                          <a:srgbClr val="000000"/>
+                        </a:solidFill>
+                        <a:effectLst/>
+                        <a:latin typeface="Calibri" panose="020F0502020204030204" pitchFamily="34" charset="0"/>
+                      </a:endParaRPr>
+                    </a:p>
+                  </a:txBody>
+                  <a:tcPr marL="6350" marR="6350" marT="6350" marB="0" anchor="b"/>
+                </a:tc>
+                <a:tc>
+                  <a:txBody>
+                    <a:bodyPr/>
+                    <a:lstStyle/>
+                    <a:p>
+                      <a:pPr algn="l" fontAlgn="b"/>
+                      <a:r>
+                        <a:rPr lang="en-GB" sz="1100" u="none" strike="noStrike">
+                          <a:effectLst/>
+                        </a:rPr>
+                        <a:t>fvx</a:t>
+                      </a:r>
+                      <a:endParaRPr lang="en-GB" sz="1100" b="0" i="0" u="none" strike="noStrike">
+                        <a:solidFill>
+                          <a:srgbClr val="000000"/>
+                        </a:solidFill>
+                        <a:effectLst/>
+                        <a:latin typeface="Calibri" panose="020F0502020204030204" pitchFamily="34" charset="0"/>
+                      </a:endParaRPr>
+                    </a:p>
+                  </a:txBody>
+                  <a:tcPr marL="6350" marR="6350" marT="6350" marB="0" anchor="b"/>
+                </a:tc>
+                <a:tc>
+                  <a:txBody>
+                    <a:bodyPr/>
+                    <a:lstStyle/>
+                    <a:p>
+                      <a:pPr algn="l" fontAlgn="b"/>
+                      <a:r>
+                        <a:rPr lang="en-GB" sz="1100" u="none" strike="noStrike">
+                          <a:effectLst/>
+                        </a:rPr>
+                        <a:t>fvy</a:t>
+                      </a:r>
+                      <a:endParaRPr lang="en-GB" sz="1100" b="0" i="0" u="none" strike="noStrike">
+                        <a:solidFill>
+                          <a:srgbClr val="000000"/>
+                        </a:solidFill>
+                        <a:effectLst/>
+                        <a:latin typeface="Calibri" panose="020F0502020204030204" pitchFamily="34" charset="0"/>
+                      </a:endParaRPr>
+                    </a:p>
+                  </a:txBody>
+                  <a:tcPr marL="6350" marR="6350" marT="6350" marB="0" anchor="b"/>
+                </a:tc>
+                <a:tc>
+                  <a:txBody>
+                    <a:bodyPr/>
+                    <a:lstStyle/>
+                    <a:p>
+                      <a:pPr algn="l" fontAlgn="b"/>
+                      <a:r>
+                        <a:rPr lang="en-GB" sz="1100" u="none" strike="noStrike">
+                          <a:effectLst/>
+                        </a:rPr>
+                        <a:t>fgvxx</a:t>
+                      </a:r>
+                      <a:endParaRPr lang="en-GB" sz="1100" b="0" i="0" u="none" strike="noStrike">
+                        <a:solidFill>
+                          <a:srgbClr val="000000"/>
+                        </a:solidFill>
+                        <a:effectLst/>
+                        <a:latin typeface="Calibri" panose="020F0502020204030204" pitchFamily="34" charset="0"/>
+                      </a:endParaRPr>
+                    </a:p>
+                  </a:txBody>
+                  <a:tcPr marL="6350" marR="6350" marT="6350" marB="0" anchor="b"/>
+                </a:tc>
+                <a:tc>
+                  <a:txBody>
+                    <a:bodyPr/>
+                    <a:lstStyle/>
+                    <a:p>
+                      <a:pPr algn="l" fontAlgn="b"/>
+                      <a:r>
+                        <a:rPr lang="en-GB" sz="1100" u="none" strike="noStrike" dirty="0" err="1">
+                          <a:effectLst/>
+                        </a:rPr>
+                        <a:t>fgvyy</a:t>
+                      </a:r>
+                      <a:endParaRPr lang="en-GB" sz="1100" b="0" i="0" u="none" strike="noStrike" dirty="0">
+                        <a:solidFill>
+                          <a:srgbClr val="000000"/>
+                        </a:solidFill>
+                        <a:effectLst/>
+                        <a:latin typeface="Calibri" panose="020F0502020204030204" pitchFamily="34" charset="0"/>
+                      </a:endParaRPr>
+                    </a:p>
+                  </a:txBody>
+                  <a:tcPr marL="6350" marR="6350" marT="6350" marB="0" anchor="b"/>
+                </a:tc>
+                <a:extLst>
+                  <a:ext uri="{0D108BD9-81ED-4DB2-BD59-A6C34878D82A}">
+                    <a16:rowId xmlns:a16="http://schemas.microsoft.com/office/drawing/2014/main" val="2350249116"/>
+                  </a:ext>
+                </a:extLst>
+              </a:tr>
+              <a:tr h="184150">
+                <a:tc>
+                  <a:txBody>
+                    <a:bodyPr/>
+                    <a:lstStyle/>
+                    <a:p>
+                      <a:pPr algn="l" fontAlgn="b"/>
+                      <a:endParaRPr lang="en-GB" sz="1100" b="0" i="0" u="none" strike="noStrike">
+                        <a:solidFill>
+                          <a:srgbClr val="000000"/>
+                        </a:solidFill>
+                        <a:effectLst/>
+                        <a:latin typeface="Calibri" panose="020F0502020204030204" pitchFamily="34" charset="0"/>
+                      </a:endParaRPr>
+                    </a:p>
+                  </a:txBody>
+                  <a:tcPr marL="6350" marR="6350" marT="6350" marB="0" anchor="b"/>
+                </a:tc>
+                <a:tc>
+                  <a:txBody>
+                    <a:bodyPr/>
+                    <a:lstStyle/>
+                    <a:p>
+                      <a:pPr algn="r" fontAlgn="b"/>
+                      <a:r>
+                        <a:rPr lang="en-GB" sz="1100" u="none" strike="noStrike">
+                          <a:effectLst/>
+                        </a:rPr>
+                        <a:t>0</a:t>
+                      </a:r>
+                      <a:endParaRPr lang="en-GB" sz="1100" b="0" i="0" u="none" strike="noStrike">
+                        <a:solidFill>
+                          <a:srgbClr val="000000"/>
+                        </a:solidFill>
+                        <a:effectLst/>
+                        <a:latin typeface="Calibri" panose="020F0502020204030204" pitchFamily="34" charset="0"/>
+                      </a:endParaRPr>
+                    </a:p>
+                  </a:txBody>
+                  <a:tcPr marL="6350" marR="6350" marT="6350" marB="0" anchor="b"/>
+                </a:tc>
+                <a:tc>
+                  <a:txBody>
+                    <a:bodyPr/>
+                    <a:lstStyle/>
+                    <a:p>
+                      <a:pPr algn="r" fontAlgn="b"/>
+                      <a:r>
+                        <a:rPr lang="en-GB" sz="1100" u="none" strike="noStrike">
+                          <a:effectLst/>
+                        </a:rPr>
+                        <a:t>0</a:t>
+                      </a:r>
+                      <a:endParaRPr lang="en-GB" sz="1100" b="0" i="0" u="none" strike="noStrike">
+                        <a:solidFill>
+                          <a:srgbClr val="000000"/>
+                        </a:solidFill>
+                        <a:effectLst/>
+                        <a:latin typeface="Calibri" panose="020F0502020204030204" pitchFamily="34" charset="0"/>
+                      </a:endParaRPr>
+                    </a:p>
+                  </a:txBody>
+                  <a:tcPr marL="6350" marR="6350" marT="6350" marB="0" anchor="b"/>
+                </a:tc>
+                <a:tc>
+                  <a:txBody>
+                    <a:bodyPr/>
+                    <a:lstStyle/>
+                    <a:p>
+                      <a:pPr algn="r" fontAlgn="b"/>
+                      <a:r>
+                        <a:rPr lang="en-GB" sz="1100" u="none" strike="noStrike">
+                          <a:effectLst/>
+                        </a:rPr>
+                        <a:t>0.2</a:t>
+                      </a:r>
+                      <a:endParaRPr lang="en-GB" sz="1100" b="0" i="0" u="none" strike="noStrike">
+                        <a:solidFill>
+                          <a:srgbClr val="000000"/>
+                        </a:solidFill>
+                        <a:effectLst/>
+                        <a:latin typeface="Calibri" panose="020F0502020204030204" pitchFamily="34" charset="0"/>
+                      </a:endParaRPr>
+                    </a:p>
+                  </a:txBody>
+                  <a:tcPr marL="6350" marR="6350" marT="6350" marB="0" anchor="b"/>
+                </a:tc>
+                <a:tc>
+                  <a:txBody>
+                    <a:bodyPr/>
+                    <a:lstStyle/>
+                    <a:p>
+                      <a:pPr algn="r" fontAlgn="b"/>
+                      <a:r>
+                        <a:rPr lang="en-GB" sz="1100" u="none" strike="noStrike">
+                          <a:effectLst/>
+                        </a:rPr>
+                        <a:t>0</a:t>
+                      </a:r>
+                      <a:endParaRPr lang="en-GB" sz="1100" b="0" i="0" u="none" strike="noStrike">
+                        <a:solidFill>
+                          <a:srgbClr val="000000"/>
+                        </a:solidFill>
+                        <a:effectLst/>
+                        <a:latin typeface="Calibri" panose="020F0502020204030204" pitchFamily="34" charset="0"/>
+                      </a:endParaRPr>
+                    </a:p>
+                  </a:txBody>
+                  <a:tcPr marL="6350" marR="6350" marT="6350" marB="0" anchor="b"/>
+                </a:tc>
+                <a:tc>
+                  <a:txBody>
+                    <a:bodyPr/>
+                    <a:lstStyle/>
+                    <a:p>
+                      <a:pPr algn="r" fontAlgn="b"/>
+                      <a:r>
+                        <a:rPr lang="en-GB" sz="1100" u="none" strike="noStrike">
+                          <a:effectLst/>
+                        </a:rPr>
+                        <a:t>0.04</a:t>
+                      </a:r>
+                      <a:endParaRPr lang="en-GB" sz="1100" b="0" i="0" u="none" strike="noStrike">
+                        <a:solidFill>
+                          <a:srgbClr val="000000"/>
+                        </a:solidFill>
+                        <a:effectLst/>
+                        <a:latin typeface="Calibri" panose="020F0502020204030204" pitchFamily="34" charset="0"/>
+                      </a:endParaRPr>
+                    </a:p>
+                  </a:txBody>
+                  <a:tcPr marL="6350" marR="6350" marT="6350" marB="0" anchor="b"/>
+                </a:tc>
+                <a:tc>
+                  <a:txBody>
+                    <a:bodyPr/>
+                    <a:lstStyle/>
+                    <a:p>
+                      <a:pPr algn="r" fontAlgn="b"/>
+                      <a:r>
+                        <a:rPr lang="en-GB" sz="1100" u="none" strike="noStrike">
+                          <a:effectLst/>
+                        </a:rPr>
+                        <a:t>-0.1</a:t>
+                      </a:r>
+                      <a:endParaRPr lang="en-GB" sz="1100" b="0" i="0" u="none" strike="noStrike">
+                        <a:solidFill>
+                          <a:srgbClr val="000000"/>
+                        </a:solidFill>
+                        <a:effectLst/>
+                        <a:latin typeface="Calibri" panose="020F0502020204030204" pitchFamily="34" charset="0"/>
+                      </a:endParaRPr>
+                    </a:p>
+                  </a:txBody>
+                  <a:tcPr marL="6350" marR="6350" marT="6350" marB="0" anchor="b"/>
+                </a:tc>
+                <a:extLst>
+                  <a:ext uri="{0D108BD9-81ED-4DB2-BD59-A6C34878D82A}">
+                    <a16:rowId xmlns:a16="http://schemas.microsoft.com/office/drawing/2014/main" val="4168356419"/>
+                  </a:ext>
+                </a:extLst>
+              </a:tr>
+              <a:tr h="184150">
+                <a:tc>
+                  <a:txBody>
+                    <a:bodyPr/>
+                    <a:lstStyle/>
+                    <a:p>
+                      <a:pPr algn="r" fontAlgn="b"/>
+                      <a:r>
+                        <a:rPr lang="en-GB" sz="1100" u="none" strike="noStrike">
+                          <a:effectLst/>
+                        </a:rPr>
+                        <a:t>366</a:t>
+                      </a:r>
+                      <a:endParaRPr lang="en-GB" sz="1100" b="0" i="0" u="none" strike="noStrike">
+                        <a:solidFill>
+                          <a:srgbClr val="000000"/>
+                        </a:solidFill>
+                        <a:effectLst/>
+                        <a:latin typeface="Calibri" panose="020F0502020204030204" pitchFamily="34" charset="0"/>
+                      </a:endParaRPr>
+                    </a:p>
+                  </a:txBody>
+                  <a:tcPr marL="6350" marR="6350" marT="6350" marB="0" anchor="b"/>
+                </a:tc>
+                <a:tc>
+                  <a:txBody>
+                    <a:bodyPr/>
+                    <a:lstStyle/>
+                    <a:p>
+                      <a:pPr algn="r" fontAlgn="b"/>
+                      <a:r>
+                        <a:rPr lang="en-GB" sz="1100" u="none" strike="noStrike">
+                          <a:effectLst/>
+                        </a:rPr>
+                        <a:t>0.1</a:t>
+                      </a:r>
+                      <a:endParaRPr lang="en-GB" sz="1100" b="0" i="0" u="none" strike="noStrike">
+                        <a:solidFill>
+                          <a:srgbClr val="000000"/>
+                        </a:solidFill>
+                        <a:effectLst/>
+                        <a:latin typeface="Calibri" panose="020F0502020204030204" pitchFamily="34" charset="0"/>
+                      </a:endParaRPr>
+                    </a:p>
+                  </a:txBody>
+                  <a:tcPr marL="6350" marR="6350" marT="6350" marB="0" anchor="b"/>
+                </a:tc>
+                <a:tc>
+                  <a:txBody>
+                    <a:bodyPr/>
+                    <a:lstStyle/>
+                    <a:p>
+                      <a:pPr algn="r" fontAlgn="b"/>
+                      <a:r>
+                        <a:rPr lang="en-GB" sz="1100" u="none" strike="noStrike">
+                          <a:effectLst/>
+                        </a:rPr>
+                        <a:t>0.1</a:t>
+                      </a:r>
+                      <a:endParaRPr lang="en-GB" sz="1100" b="0" i="0" u="none" strike="noStrike">
+                        <a:solidFill>
+                          <a:srgbClr val="000000"/>
+                        </a:solidFill>
+                        <a:effectLst/>
+                        <a:latin typeface="Calibri" panose="020F0502020204030204" pitchFamily="34" charset="0"/>
+                      </a:endParaRPr>
+                    </a:p>
+                  </a:txBody>
+                  <a:tcPr marL="6350" marR="6350" marT="6350" marB="0" anchor="b"/>
+                </a:tc>
+                <a:tc>
+                  <a:txBody>
+                    <a:bodyPr/>
+                    <a:lstStyle/>
+                    <a:p>
+                      <a:pPr algn="r" fontAlgn="b"/>
+                      <a:r>
+                        <a:rPr lang="en-GB" sz="1100" u="none" strike="noStrike" dirty="0">
+                          <a:effectLst/>
+                        </a:rPr>
+                        <a:t>0.204</a:t>
+                      </a:r>
+                      <a:endParaRPr lang="en-GB" sz="1100" b="0" i="0" u="none" strike="noStrike" dirty="0">
+                        <a:solidFill>
+                          <a:srgbClr val="000000"/>
+                        </a:solidFill>
+                        <a:effectLst/>
+                        <a:latin typeface="Calibri" panose="020F0502020204030204" pitchFamily="34" charset="0"/>
+                      </a:endParaRPr>
+                    </a:p>
+                  </a:txBody>
+                  <a:tcPr marL="6350" marR="6350" marT="6350" marB="0" anchor="b"/>
+                </a:tc>
+                <a:tc>
+                  <a:txBody>
+                    <a:bodyPr/>
+                    <a:lstStyle/>
+                    <a:p>
+                      <a:pPr algn="r" fontAlgn="b"/>
+                      <a:r>
+                        <a:rPr lang="en-GB" sz="1100" u="none" strike="noStrike">
+                          <a:effectLst/>
+                        </a:rPr>
+                        <a:t>-0.01</a:t>
+                      </a:r>
+                      <a:endParaRPr lang="en-GB" sz="1100" b="0" i="0" u="none" strike="noStrike">
+                        <a:solidFill>
+                          <a:srgbClr val="000000"/>
+                        </a:solidFill>
+                        <a:effectLst/>
+                        <a:latin typeface="Calibri" panose="020F0502020204030204" pitchFamily="34" charset="0"/>
+                      </a:endParaRPr>
+                    </a:p>
+                  </a:txBody>
+                  <a:tcPr marL="6350" marR="6350" marT="6350" marB="0" anchor="b"/>
+                </a:tc>
+                <a:tc>
+                  <a:txBody>
+                    <a:bodyPr/>
+                    <a:lstStyle/>
+                    <a:p>
+                      <a:pPr algn="r" fontAlgn="b"/>
+                      <a:r>
+                        <a:rPr lang="en-GB" sz="1100" u="none" strike="noStrike">
+                          <a:effectLst/>
+                        </a:rPr>
+                        <a:t>0.042</a:t>
+                      </a:r>
+                      <a:endParaRPr lang="en-GB" sz="1100" b="0" i="0" u="none" strike="noStrike">
+                        <a:solidFill>
+                          <a:srgbClr val="000000"/>
+                        </a:solidFill>
+                        <a:effectLst/>
+                        <a:latin typeface="Calibri" panose="020F0502020204030204" pitchFamily="34" charset="0"/>
+                      </a:endParaRPr>
+                    </a:p>
+                  </a:txBody>
+                  <a:tcPr marL="6350" marR="6350" marT="6350" marB="0" anchor="b"/>
+                </a:tc>
+                <a:tc>
+                  <a:txBody>
+                    <a:bodyPr/>
+                    <a:lstStyle/>
+                    <a:p>
+                      <a:pPr algn="r" fontAlgn="b"/>
+                      <a:r>
+                        <a:rPr lang="en-GB" sz="1100" u="none" strike="noStrike" dirty="0">
+                          <a:effectLst/>
+                        </a:rPr>
+                        <a:t>-0.1</a:t>
+                      </a:r>
+                      <a:endParaRPr lang="en-GB" sz="1100" b="0" i="0" u="none" strike="noStrike" dirty="0">
+                        <a:solidFill>
+                          <a:srgbClr val="000000"/>
+                        </a:solidFill>
+                        <a:effectLst/>
+                        <a:latin typeface="Calibri" panose="020F0502020204030204" pitchFamily="34" charset="0"/>
+                      </a:endParaRPr>
+                    </a:p>
+                  </a:txBody>
+                  <a:tcPr marL="6350" marR="6350" marT="6350" marB="0" anchor="b"/>
+                </a:tc>
+                <a:extLst>
+                  <a:ext uri="{0D108BD9-81ED-4DB2-BD59-A6C34878D82A}">
+                    <a16:rowId xmlns:a16="http://schemas.microsoft.com/office/drawing/2014/main" val="1375864454"/>
+                  </a:ext>
+                </a:extLst>
+              </a:tr>
+              <a:tr h="184150">
+                <a:tc>
+                  <a:txBody>
+                    <a:bodyPr/>
+                    <a:lstStyle/>
+                    <a:p>
+                      <a:pPr algn="r" fontAlgn="b"/>
+                      <a:r>
+                        <a:rPr lang="en-GB" sz="1100" u="none" strike="noStrike">
+                          <a:effectLst/>
+                        </a:rPr>
+                        <a:t>576</a:t>
+                      </a:r>
+                      <a:endParaRPr lang="en-GB" sz="1100" b="0" i="0" u="none" strike="noStrike">
+                        <a:solidFill>
+                          <a:srgbClr val="000000"/>
+                        </a:solidFill>
+                        <a:effectLst/>
+                        <a:latin typeface="Calibri" panose="020F0502020204030204" pitchFamily="34" charset="0"/>
+                      </a:endParaRPr>
+                    </a:p>
+                  </a:txBody>
+                  <a:tcPr marL="6350" marR="6350" marT="6350" marB="0" anchor="b"/>
+                </a:tc>
+                <a:tc>
+                  <a:txBody>
+                    <a:bodyPr/>
+                    <a:lstStyle/>
+                    <a:p>
+                      <a:pPr algn="r" fontAlgn="b"/>
+                      <a:r>
+                        <a:rPr lang="en-GB" sz="1100" u="none" strike="noStrike">
+                          <a:effectLst/>
+                        </a:rPr>
+                        <a:t>2.1</a:t>
+                      </a:r>
+                      <a:endParaRPr lang="en-GB" sz="1100" b="0" i="0" u="none" strike="noStrike">
+                        <a:solidFill>
+                          <a:srgbClr val="000000"/>
+                        </a:solidFill>
+                        <a:effectLst/>
+                        <a:latin typeface="Calibri" panose="020F0502020204030204" pitchFamily="34" charset="0"/>
+                      </a:endParaRPr>
+                    </a:p>
+                  </a:txBody>
+                  <a:tcPr marL="6350" marR="6350" marT="6350" marB="0" anchor="b"/>
+                </a:tc>
+                <a:tc>
+                  <a:txBody>
+                    <a:bodyPr/>
+                    <a:lstStyle/>
+                    <a:p>
+                      <a:pPr algn="r" fontAlgn="b"/>
+                      <a:r>
+                        <a:rPr lang="en-GB" sz="1100" u="none" strike="noStrike">
+                          <a:effectLst/>
+                        </a:rPr>
+                        <a:t>2.1</a:t>
+                      </a:r>
+                      <a:endParaRPr lang="en-GB" sz="1100" b="0" i="0" u="none" strike="noStrike">
+                        <a:solidFill>
+                          <a:srgbClr val="000000"/>
+                        </a:solidFill>
+                        <a:effectLst/>
+                        <a:latin typeface="Calibri" panose="020F0502020204030204" pitchFamily="34" charset="0"/>
+                      </a:endParaRPr>
+                    </a:p>
+                  </a:txBody>
+                  <a:tcPr marL="6350" marR="6350" marT="6350" marB="0" anchor="b"/>
+                </a:tc>
+                <a:tc>
+                  <a:txBody>
+                    <a:bodyPr/>
+                    <a:lstStyle/>
+                    <a:p>
+                      <a:pPr algn="r" fontAlgn="b"/>
+                      <a:r>
+                        <a:rPr lang="en-GB" sz="1100" u="none" strike="noStrike">
+                          <a:effectLst/>
+                        </a:rPr>
+                        <a:t>0.345</a:t>
+                      </a:r>
+                      <a:endParaRPr lang="en-GB" sz="1100" b="0" i="0" u="none" strike="noStrike">
+                        <a:solidFill>
+                          <a:srgbClr val="000000"/>
+                        </a:solidFill>
+                        <a:effectLst/>
+                        <a:latin typeface="Calibri" panose="020F0502020204030204" pitchFamily="34" charset="0"/>
+                      </a:endParaRPr>
+                    </a:p>
+                  </a:txBody>
+                  <a:tcPr marL="6350" marR="6350" marT="6350" marB="0" anchor="b"/>
+                </a:tc>
+                <a:tc>
+                  <a:txBody>
+                    <a:bodyPr/>
+                    <a:lstStyle/>
+                    <a:p>
+                      <a:pPr algn="r" fontAlgn="b"/>
+                      <a:r>
+                        <a:rPr lang="en-GB" sz="1100" u="none" strike="noStrike">
+                          <a:effectLst/>
+                        </a:rPr>
+                        <a:t>-0.21</a:t>
+                      </a:r>
+                      <a:endParaRPr lang="en-GB" sz="1100" b="0" i="0" u="none" strike="noStrike">
+                        <a:solidFill>
+                          <a:srgbClr val="000000"/>
+                        </a:solidFill>
+                        <a:effectLst/>
+                        <a:latin typeface="Calibri" panose="020F0502020204030204" pitchFamily="34" charset="0"/>
+                      </a:endParaRPr>
+                    </a:p>
+                  </a:txBody>
+                  <a:tcPr marL="6350" marR="6350" marT="6350" marB="0" anchor="b"/>
+                </a:tc>
+                <a:tc>
+                  <a:txBody>
+                    <a:bodyPr/>
+                    <a:lstStyle/>
+                    <a:p>
+                      <a:pPr algn="r" fontAlgn="b"/>
+                      <a:r>
+                        <a:rPr lang="en-GB" sz="1100" u="none" strike="noStrike" dirty="0">
+                          <a:effectLst/>
+                        </a:rPr>
+                        <a:t>0.119</a:t>
+                      </a:r>
+                      <a:endParaRPr lang="en-GB" sz="1100" b="0" i="0" u="none" strike="noStrike" dirty="0">
+                        <a:solidFill>
+                          <a:srgbClr val="000000"/>
+                        </a:solidFill>
+                        <a:effectLst/>
+                        <a:latin typeface="Calibri" panose="020F0502020204030204" pitchFamily="34" charset="0"/>
+                      </a:endParaRPr>
+                    </a:p>
+                  </a:txBody>
+                  <a:tcPr marL="6350" marR="6350" marT="6350" marB="0" anchor="b"/>
+                </a:tc>
+                <a:tc>
+                  <a:txBody>
+                    <a:bodyPr/>
+                    <a:lstStyle/>
+                    <a:p>
+                      <a:pPr algn="r" fontAlgn="b"/>
+                      <a:r>
+                        <a:rPr lang="en-GB" sz="1100" u="none" strike="noStrike">
+                          <a:effectLst/>
+                        </a:rPr>
+                        <a:t>-0.1</a:t>
+                      </a:r>
+                      <a:endParaRPr lang="en-GB" sz="1100" b="0" i="0" u="none" strike="noStrike">
+                        <a:solidFill>
+                          <a:srgbClr val="000000"/>
+                        </a:solidFill>
+                        <a:effectLst/>
+                        <a:latin typeface="Calibri" panose="020F0502020204030204" pitchFamily="34" charset="0"/>
+                      </a:endParaRPr>
+                    </a:p>
+                  </a:txBody>
+                  <a:tcPr marL="6350" marR="6350" marT="6350" marB="0" anchor="b"/>
+                </a:tc>
+                <a:extLst>
+                  <a:ext uri="{0D108BD9-81ED-4DB2-BD59-A6C34878D82A}">
+                    <a16:rowId xmlns:a16="http://schemas.microsoft.com/office/drawing/2014/main" val="1342378684"/>
+                  </a:ext>
+                </a:extLst>
+              </a:tr>
+              <a:tr h="184150">
+                <a:tc>
+                  <a:txBody>
+                    <a:bodyPr/>
+                    <a:lstStyle/>
+                    <a:p>
+                      <a:pPr algn="r" fontAlgn="b"/>
+                      <a:r>
+                        <a:rPr lang="en-GB" sz="1100" u="none" strike="noStrike">
+                          <a:effectLst/>
+                        </a:rPr>
+                        <a:t>746</a:t>
+                      </a:r>
+                      <a:endParaRPr lang="en-GB" sz="1100" b="0" i="0" u="none" strike="noStrike">
+                        <a:solidFill>
+                          <a:srgbClr val="000000"/>
+                        </a:solidFill>
+                        <a:effectLst/>
+                        <a:latin typeface="Calibri" panose="020F0502020204030204" pitchFamily="34" charset="0"/>
+                      </a:endParaRPr>
+                    </a:p>
+                  </a:txBody>
+                  <a:tcPr marL="6350" marR="6350" marT="6350" marB="0" anchor="b"/>
+                </a:tc>
+                <a:tc>
+                  <a:txBody>
+                    <a:bodyPr/>
+                    <a:lstStyle/>
+                    <a:p>
+                      <a:pPr algn="r" fontAlgn="b"/>
+                      <a:r>
+                        <a:rPr lang="en-GB" sz="1100" u="none" strike="noStrike">
+                          <a:effectLst/>
+                        </a:rPr>
+                        <a:t>3.9</a:t>
+                      </a:r>
+                      <a:endParaRPr lang="en-GB" sz="1100" b="0" i="0" u="none" strike="noStrike">
+                        <a:solidFill>
+                          <a:srgbClr val="000000"/>
+                        </a:solidFill>
+                        <a:effectLst/>
+                        <a:latin typeface="Calibri" panose="020F0502020204030204" pitchFamily="34" charset="0"/>
+                      </a:endParaRPr>
+                    </a:p>
+                  </a:txBody>
+                  <a:tcPr marL="6350" marR="6350" marT="6350" marB="0" anchor="b"/>
+                </a:tc>
+                <a:tc>
+                  <a:txBody>
+                    <a:bodyPr/>
+                    <a:lstStyle/>
+                    <a:p>
+                      <a:pPr algn="r" fontAlgn="b"/>
+                      <a:r>
+                        <a:rPr lang="en-GB" sz="1100" u="none" strike="noStrike" dirty="0">
+                          <a:effectLst/>
+                        </a:rPr>
+                        <a:t>0.1</a:t>
+                      </a:r>
+                      <a:endParaRPr lang="en-GB" sz="1100" b="0" i="0" u="none" strike="noStrike" dirty="0">
+                        <a:solidFill>
+                          <a:srgbClr val="000000"/>
+                        </a:solidFill>
+                        <a:effectLst/>
+                        <a:latin typeface="Calibri" panose="020F0502020204030204" pitchFamily="34" charset="0"/>
+                      </a:endParaRPr>
+                    </a:p>
+                  </a:txBody>
+                  <a:tcPr marL="6350" marR="6350" marT="6350" marB="0" anchor="b"/>
+                </a:tc>
+                <a:tc>
+                  <a:txBody>
+                    <a:bodyPr/>
+                    <a:lstStyle/>
+                    <a:p>
+                      <a:pPr algn="r" fontAlgn="b"/>
+                      <a:r>
+                        <a:rPr lang="en-GB" sz="1100" u="none" strike="noStrike">
+                          <a:effectLst/>
+                        </a:rPr>
+                        <a:t>0.909</a:t>
+                      </a:r>
+                      <a:endParaRPr lang="en-GB" sz="1100" b="0" i="0" u="none" strike="noStrike">
+                        <a:solidFill>
+                          <a:srgbClr val="000000"/>
+                        </a:solidFill>
+                        <a:effectLst/>
+                        <a:latin typeface="Calibri" panose="020F0502020204030204" pitchFamily="34" charset="0"/>
+                      </a:endParaRPr>
+                    </a:p>
+                  </a:txBody>
+                  <a:tcPr marL="6350" marR="6350" marT="6350" marB="0" anchor="b"/>
+                </a:tc>
+                <a:tc>
+                  <a:txBody>
+                    <a:bodyPr/>
+                    <a:lstStyle/>
+                    <a:p>
+                      <a:pPr algn="r" fontAlgn="b"/>
+                      <a:r>
+                        <a:rPr lang="en-GB" sz="1100" u="none" strike="noStrike">
+                          <a:effectLst/>
+                        </a:rPr>
+                        <a:t>-0.01</a:t>
+                      </a:r>
+                      <a:endParaRPr lang="en-GB" sz="1100" b="0" i="0" u="none" strike="noStrike">
+                        <a:solidFill>
+                          <a:srgbClr val="000000"/>
+                        </a:solidFill>
+                        <a:effectLst/>
+                        <a:latin typeface="Calibri" panose="020F0502020204030204" pitchFamily="34" charset="0"/>
+                      </a:endParaRPr>
+                    </a:p>
+                  </a:txBody>
+                  <a:tcPr marL="6350" marR="6350" marT="6350" marB="0" anchor="b"/>
+                </a:tc>
+                <a:tc>
+                  <a:txBody>
+                    <a:bodyPr/>
+                    <a:lstStyle/>
+                    <a:p>
+                      <a:pPr algn="r" fontAlgn="b"/>
+                      <a:r>
+                        <a:rPr lang="en-GB" sz="1100" u="none" strike="noStrike">
+                          <a:effectLst/>
+                        </a:rPr>
+                        <a:t>0.826</a:t>
+                      </a:r>
+                      <a:endParaRPr lang="en-GB" sz="1100" b="0" i="0" u="none" strike="noStrike">
+                        <a:solidFill>
+                          <a:srgbClr val="000000"/>
+                        </a:solidFill>
+                        <a:effectLst/>
+                        <a:latin typeface="Calibri" panose="020F0502020204030204" pitchFamily="34" charset="0"/>
+                      </a:endParaRPr>
+                    </a:p>
+                  </a:txBody>
+                  <a:tcPr marL="6350" marR="6350" marT="6350" marB="0" anchor="b"/>
+                </a:tc>
+                <a:tc>
+                  <a:txBody>
+                    <a:bodyPr/>
+                    <a:lstStyle/>
+                    <a:p>
+                      <a:pPr algn="r" fontAlgn="b"/>
+                      <a:r>
+                        <a:rPr lang="en-GB" sz="1100" u="none" strike="noStrike">
+                          <a:effectLst/>
+                        </a:rPr>
+                        <a:t>-0.1</a:t>
+                      </a:r>
+                      <a:endParaRPr lang="en-GB" sz="1100" b="0" i="0" u="none" strike="noStrike">
+                        <a:solidFill>
+                          <a:srgbClr val="000000"/>
+                        </a:solidFill>
+                        <a:effectLst/>
+                        <a:latin typeface="Calibri" panose="020F0502020204030204" pitchFamily="34" charset="0"/>
+                      </a:endParaRPr>
+                    </a:p>
+                  </a:txBody>
+                  <a:tcPr marL="6350" marR="6350" marT="6350" marB="0" anchor="b"/>
+                </a:tc>
+                <a:extLst>
+                  <a:ext uri="{0D108BD9-81ED-4DB2-BD59-A6C34878D82A}">
+                    <a16:rowId xmlns:a16="http://schemas.microsoft.com/office/drawing/2014/main" val="3173969845"/>
+                  </a:ext>
+                </a:extLst>
+              </a:tr>
+              <a:tr h="184150">
+                <a:tc>
+                  <a:txBody>
+                    <a:bodyPr/>
+                    <a:lstStyle/>
+                    <a:p>
+                      <a:pPr algn="r" fontAlgn="b"/>
+                      <a:r>
+                        <a:rPr lang="en-GB" sz="1100" u="none" strike="noStrike">
+                          <a:effectLst/>
+                        </a:rPr>
+                        <a:t>765</a:t>
+                      </a:r>
+                      <a:endParaRPr lang="en-GB" sz="1100" b="0" i="0" u="none" strike="noStrike">
+                        <a:solidFill>
+                          <a:srgbClr val="000000"/>
+                        </a:solidFill>
+                        <a:effectLst/>
+                        <a:latin typeface="Calibri" panose="020F0502020204030204" pitchFamily="34" charset="0"/>
+                      </a:endParaRPr>
+                    </a:p>
+                  </a:txBody>
+                  <a:tcPr marL="6350" marR="6350" marT="6350" marB="0" anchor="b"/>
+                </a:tc>
+                <a:tc>
+                  <a:txBody>
+                    <a:bodyPr/>
+                    <a:lstStyle/>
+                    <a:p>
+                      <a:pPr algn="r" fontAlgn="b"/>
+                      <a:r>
+                        <a:rPr lang="en-GB" sz="1100" u="none" strike="noStrike">
+                          <a:effectLst/>
+                        </a:rPr>
+                        <a:t>3.9</a:t>
+                      </a:r>
+                      <a:endParaRPr lang="en-GB" sz="1100" b="0" i="0" u="none" strike="noStrike">
+                        <a:solidFill>
+                          <a:srgbClr val="000000"/>
+                        </a:solidFill>
+                        <a:effectLst/>
+                        <a:latin typeface="Calibri" panose="020F0502020204030204" pitchFamily="34" charset="0"/>
+                      </a:endParaRPr>
+                    </a:p>
+                  </a:txBody>
+                  <a:tcPr marL="6350" marR="6350" marT="6350" marB="0" anchor="b"/>
+                </a:tc>
+                <a:tc>
+                  <a:txBody>
+                    <a:bodyPr/>
+                    <a:lstStyle/>
+                    <a:p>
+                      <a:pPr algn="r" fontAlgn="b"/>
+                      <a:r>
+                        <a:rPr lang="en-GB" sz="1100" u="none" strike="noStrike" dirty="0">
+                          <a:effectLst/>
+                        </a:rPr>
+                        <a:t>3.9</a:t>
+                      </a:r>
+                      <a:endParaRPr lang="en-GB" sz="1100" b="0" i="0" u="none" strike="noStrike" dirty="0">
+                        <a:solidFill>
+                          <a:srgbClr val="000000"/>
+                        </a:solidFill>
+                        <a:effectLst/>
+                        <a:latin typeface="Calibri" panose="020F0502020204030204" pitchFamily="34" charset="0"/>
+                      </a:endParaRPr>
+                    </a:p>
+                  </a:txBody>
+                  <a:tcPr marL="6350" marR="6350" marT="6350" marB="0" anchor="b"/>
+                </a:tc>
+                <a:tc>
+                  <a:txBody>
+                    <a:bodyPr/>
+                    <a:lstStyle/>
+                    <a:p>
+                      <a:pPr algn="r" fontAlgn="b"/>
+                      <a:r>
+                        <a:rPr lang="en-GB" sz="1100" u="none" strike="noStrike">
+                          <a:effectLst/>
+                        </a:rPr>
+                        <a:t>0.909</a:t>
+                      </a:r>
+                      <a:endParaRPr lang="en-GB" sz="1100" b="0" i="0" u="none" strike="noStrike">
+                        <a:solidFill>
+                          <a:srgbClr val="000000"/>
+                        </a:solidFill>
+                        <a:effectLst/>
+                        <a:latin typeface="Calibri" panose="020F0502020204030204" pitchFamily="34" charset="0"/>
+                      </a:endParaRPr>
+                    </a:p>
+                  </a:txBody>
+                  <a:tcPr marL="6350" marR="6350" marT="6350" marB="0" anchor="b"/>
+                </a:tc>
+                <a:tc>
+                  <a:txBody>
+                    <a:bodyPr/>
+                    <a:lstStyle/>
+                    <a:p>
+                      <a:pPr algn="r" fontAlgn="b"/>
+                      <a:r>
+                        <a:rPr lang="en-GB" sz="1100" u="none" strike="noStrike">
+                          <a:effectLst/>
+                        </a:rPr>
+                        <a:t>-0.39</a:t>
+                      </a:r>
+                      <a:endParaRPr lang="en-GB" sz="1100" b="0" i="0" u="none" strike="noStrike">
+                        <a:solidFill>
+                          <a:srgbClr val="000000"/>
+                        </a:solidFill>
+                        <a:effectLst/>
+                        <a:latin typeface="Calibri" panose="020F0502020204030204" pitchFamily="34" charset="0"/>
+                      </a:endParaRPr>
+                    </a:p>
+                  </a:txBody>
+                  <a:tcPr marL="6350" marR="6350" marT="6350" marB="0" anchor="b"/>
+                </a:tc>
+                <a:tc>
+                  <a:txBody>
+                    <a:bodyPr/>
+                    <a:lstStyle/>
+                    <a:p>
+                      <a:pPr algn="r" fontAlgn="b"/>
+                      <a:r>
+                        <a:rPr lang="en-GB" sz="1100" u="none" strike="noStrike">
+                          <a:effectLst/>
+                        </a:rPr>
+                        <a:t>0.826</a:t>
+                      </a:r>
+                      <a:endParaRPr lang="en-GB" sz="1100" b="0" i="0" u="none" strike="noStrike">
+                        <a:solidFill>
+                          <a:srgbClr val="000000"/>
+                        </a:solidFill>
+                        <a:effectLst/>
+                        <a:latin typeface="Calibri" panose="020F0502020204030204" pitchFamily="34" charset="0"/>
+                      </a:endParaRPr>
+                    </a:p>
+                  </a:txBody>
+                  <a:tcPr marL="6350" marR="6350" marT="6350" marB="0" anchor="b"/>
+                </a:tc>
+                <a:tc>
+                  <a:txBody>
+                    <a:bodyPr/>
+                    <a:lstStyle/>
+                    <a:p>
+                      <a:pPr algn="r" fontAlgn="b"/>
+                      <a:r>
+                        <a:rPr lang="en-GB" sz="1100" u="none" strike="noStrike">
+                          <a:effectLst/>
+                        </a:rPr>
+                        <a:t>-0.1</a:t>
+                      </a:r>
+                      <a:endParaRPr lang="en-GB" sz="1100" b="0" i="0" u="none" strike="noStrike">
+                        <a:solidFill>
+                          <a:srgbClr val="000000"/>
+                        </a:solidFill>
+                        <a:effectLst/>
+                        <a:latin typeface="Calibri" panose="020F0502020204030204" pitchFamily="34" charset="0"/>
+                      </a:endParaRPr>
+                    </a:p>
+                  </a:txBody>
+                  <a:tcPr marL="6350" marR="6350" marT="6350" marB="0" anchor="b"/>
+                </a:tc>
+                <a:extLst>
+                  <a:ext uri="{0D108BD9-81ED-4DB2-BD59-A6C34878D82A}">
+                    <a16:rowId xmlns:a16="http://schemas.microsoft.com/office/drawing/2014/main" val="2367600982"/>
+                  </a:ext>
+                </a:extLst>
+              </a:tr>
+              <a:tr h="184150">
+                <a:tc>
+                  <a:txBody>
+                    <a:bodyPr/>
+                    <a:lstStyle/>
+                    <a:p>
+                      <a:pPr algn="l" fontAlgn="b"/>
+                      <a:endParaRPr lang="en-GB" sz="1100" b="0" i="0" u="none" strike="noStrike">
+                        <a:solidFill>
+                          <a:srgbClr val="000000"/>
+                        </a:solidFill>
+                        <a:effectLst/>
+                        <a:latin typeface="Calibri" panose="020F0502020204030204" pitchFamily="34" charset="0"/>
+                      </a:endParaRPr>
+                    </a:p>
+                  </a:txBody>
+                  <a:tcPr marL="6350" marR="6350" marT="6350" marB="0" anchor="b"/>
+                </a:tc>
+                <a:tc>
+                  <a:txBody>
+                    <a:bodyPr/>
+                    <a:lstStyle/>
+                    <a:p>
+                      <a:pPr algn="r" fontAlgn="b"/>
+                      <a:r>
+                        <a:rPr lang="en-GB" sz="1100" u="none" strike="noStrike">
+                          <a:effectLst/>
+                        </a:rPr>
+                        <a:t>4</a:t>
+                      </a:r>
+                      <a:endParaRPr lang="en-GB" sz="1100" b="0" i="0" u="none" strike="noStrike">
+                        <a:solidFill>
+                          <a:srgbClr val="000000"/>
+                        </a:solidFill>
+                        <a:effectLst/>
+                        <a:latin typeface="Calibri" panose="020F0502020204030204" pitchFamily="34" charset="0"/>
+                      </a:endParaRPr>
+                    </a:p>
+                  </a:txBody>
+                  <a:tcPr marL="6350" marR="6350" marT="6350" marB="0" anchor="b"/>
+                </a:tc>
+                <a:tc>
+                  <a:txBody>
+                    <a:bodyPr/>
+                    <a:lstStyle/>
+                    <a:p>
+                      <a:pPr algn="r" fontAlgn="b"/>
+                      <a:r>
+                        <a:rPr lang="en-GB" sz="1100" u="none" strike="noStrike">
+                          <a:effectLst/>
+                        </a:rPr>
+                        <a:t>4</a:t>
+                      </a:r>
+                      <a:endParaRPr lang="en-GB" sz="1100" b="0" i="0" u="none" strike="noStrike">
+                        <a:solidFill>
+                          <a:srgbClr val="000000"/>
+                        </a:solidFill>
+                        <a:effectLst/>
+                        <a:latin typeface="Calibri" panose="020F0502020204030204" pitchFamily="34" charset="0"/>
+                      </a:endParaRPr>
+                    </a:p>
+                  </a:txBody>
+                  <a:tcPr marL="6350" marR="6350" marT="6350" marB="0" anchor="b"/>
+                </a:tc>
+                <a:tc>
+                  <a:txBody>
+                    <a:bodyPr/>
+                    <a:lstStyle/>
+                    <a:p>
+                      <a:pPr algn="r" fontAlgn="b"/>
+                      <a:r>
+                        <a:rPr lang="en-GB" sz="1100" u="none" strike="noStrike">
+                          <a:effectLst/>
+                        </a:rPr>
+                        <a:t>1</a:t>
+                      </a:r>
+                      <a:endParaRPr lang="en-GB" sz="1100" b="0" i="0" u="none" strike="noStrike">
+                        <a:solidFill>
+                          <a:srgbClr val="000000"/>
+                        </a:solidFill>
+                        <a:effectLst/>
+                        <a:latin typeface="Calibri" panose="020F0502020204030204" pitchFamily="34" charset="0"/>
+                      </a:endParaRPr>
+                    </a:p>
+                  </a:txBody>
+                  <a:tcPr marL="6350" marR="6350" marT="6350" marB="0" anchor="b"/>
+                </a:tc>
+                <a:tc>
+                  <a:txBody>
+                    <a:bodyPr/>
+                    <a:lstStyle/>
+                    <a:p>
+                      <a:pPr algn="r" fontAlgn="b"/>
+                      <a:r>
+                        <a:rPr lang="en-GB" sz="1100" u="none" strike="noStrike">
+                          <a:effectLst/>
+                        </a:rPr>
+                        <a:t>-0.4</a:t>
+                      </a:r>
+                      <a:endParaRPr lang="en-GB" sz="1100" b="0" i="0" u="none" strike="noStrike">
+                        <a:solidFill>
+                          <a:srgbClr val="000000"/>
+                        </a:solidFill>
+                        <a:effectLst/>
+                        <a:latin typeface="Calibri" panose="020F0502020204030204" pitchFamily="34" charset="0"/>
+                      </a:endParaRPr>
+                    </a:p>
+                  </a:txBody>
+                  <a:tcPr marL="6350" marR="6350" marT="6350" marB="0" anchor="b"/>
+                </a:tc>
+                <a:tc>
+                  <a:txBody>
+                    <a:bodyPr/>
+                    <a:lstStyle/>
+                    <a:p>
+                      <a:pPr algn="r" fontAlgn="b"/>
+                      <a:r>
+                        <a:rPr lang="en-GB" sz="1100" u="none" strike="noStrike">
+                          <a:effectLst/>
+                        </a:rPr>
+                        <a:t>1</a:t>
+                      </a:r>
+                      <a:endParaRPr lang="en-GB" sz="1100" b="0" i="0" u="none" strike="noStrike">
+                        <a:solidFill>
+                          <a:srgbClr val="000000"/>
+                        </a:solidFill>
+                        <a:effectLst/>
+                        <a:latin typeface="Calibri" panose="020F0502020204030204" pitchFamily="34" charset="0"/>
+                      </a:endParaRPr>
+                    </a:p>
+                  </a:txBody>
+                  <a:tcPr marL="6350" marR="6350" marT="6350" marB="0" anchor="b"/>
+                </a:tc>
+                <a:tc>
+                  <a:txBody>
+                    <a:bodyPr/>
+                    <a:lstStyle/>
+                    <a:p>
+                      <a:pPr algn="r" fontAlgn="b"/>
+                      <a:r>
+                        <a:rPr lang="en-GB" sz="1100" u="none" strike="noStrike" dirty="0">
+                          <a:effectLst/>
+                        </a:rPr>
+                        <a:t>-0.1</a:t>
+                      </a:r>
+                      <a:endParaRPr lang="en-GB" sz="1100" b="0" i="0" u="none" strike="noStrike" dirty="0">
+                        <a:solidFill>
+                          <a:srgbClr val="000000"/>
+                        </a:solidFill>
+                        <a:effectLst/>
+                        <a:latin typeface="Calibri" panose="020F0502020204030204" pitchFamily="34" charset="0"/>
+                      </a:endParaRPr>
+                    </a:p>
+                  </a:txBody>
+                  <a:tcPr marL="6350" marR="6350" marT="6350" marB="0" anchor="b"/>
+                </a:tc>
+                <a:extLst>
+                  <a:ext uri="{0D108BD9-81ED-4DB2-BD59-A6C34878D82A}">
+                    <a16:rowId xmlns:a16="http://schemas.microsoft.com/office/drawing/2014/main" val="1432509674"/>
+                  </a:ext>
+                </a:extLst>
+              </a:tr>
+            </a:tbl>
+          </a:graphicData>
+        </a:graphic>
+      </p:graphicFrame>
+      <p:pic>
+        <p:nvPicPr>
+          <p:cNvPr id="5" name="Picture 4">
+            <a:extLst>
+              <a:ext uri="{FF2B5EF4-FFF2-40B4-BE49-F238E27FC236}">
+                <a16:creationId xmlns:a16="http://schemas.microsoft.com/office/drawing/2014/main" id="{970AAE11-CCE2-9526-54BB-EC9EF8E11200}"/>
+              </a:ext>
+            </a:extLst>
+          </p:cNvPr>
+          <p:cNvPicPr>
+            <a:picLocks noChangeAspect="1"/>
+          </p:cNvPicPr>
+          <p:nvPr/>
+        </p:nvPicPr>
+        <p:blipFill>
+          <a:blip r:embed="rId4"/>
+          <a:stretch>
+            <a:fillRect/>
+          </a:stretch>
+        </p:blipFill>
+        <p:spPr>
+          <a:xfrm>
+            <a:off x="4872388" y="1478993"/>
+            <a:ext cx="3657788" cy="3657788"/>
+          </a:xfrm>
+          <a:prstGeom prst="rect">
+            <a:avLst/>
+          </a:prstGeom>
+        </p:spPr>
+      </p:pic>
+      <p:pic>
+        <p:nvPicPr>
+          <p:cNvPr id="11" name="Picture 10">
+            <a:extLst>
+              <a:ext uri="{FF2B5EF4-FFF2-40B4-BE49-F238E27FC236}">
+                <a16:creationId xmlns:a16="http://schemas.microsoft.com/office/drawing/2014/main" id="{0C12F12E-E3F7-883E-0DB5-31A85BB44591}"/>
+              </a:ext>
+            </a:extLst>
+          </p:cNvPr>
+          <p:cNvPicPr>
+            <a:picLocks noChangeAspect="1"/>
+          </p:cNvPicPr>
+          <p:nvPr/>
+        </p:nvPicPr>
+        <p:blipFill>
+          <a:blip r:embed="rId5"/>
+          <a:stretch>
+            <a:fillRect/>
+          </a:stretch>
+        </p:blipFill>
+        <p:spPr>
+          <a:xfrm>
+            <a:off x="7323392" y="1478993"/>
+            <a:ext cx="3657788" cy="3657788"/>
+          </a:xfrm>
+          <a:prstGeom prst="rect">
+            <a:avLst/>
+          </a:prstGeom>
+        </p:spPr>
+      </p:pic>
+      <p:pic>
+        <p:nvPicPr>
+          <p:cNvPr id="13" name="Picture 12">
+            <a:extLst>
+              <a:ext uri="{FF2B5EF4-FFF2-40B4-BE49-F238E27FC236}">
+                <a16:creationId xmlns:a16="http://schemas.microsoft.com/office/drawing/2014/main" id="{75211DFF-2320-EAFB-1D52-0A1C309EA45D}"/>
+              </a:ext>
+            </a:extLst>
+          </p:cNvPr>
+          <p:cNvPicPr>
+            <a:picLocks noChangeAspect="1"/>
+          </p:cNvPicPr>
+          <p:nvPr/>
+        </p:nvPicPr>
+        <p:blipFill>
+          <a:blip r:embed="rId6"/>
+          <a:stretch>
+            <a:fillRect/>
+          </a:stretch>
+        </p:blipFill>
+        <p:spPr>
+          <a:xfrm>
+            <a:off x="9817609" y="1478993"/>
+            <a:ext cx="3657788" cy="3657788"/>
+          </a:xfrm>
+          <a:prstGeom prst="rect">
+            <a:avLst/>
+          </a:prstGeom>
+        </p:spPr>
+      </p:pic>
+    </p:spTree>
+    <p:extLst>
+      <p:ext uri="{BB962C8B-B14F-4D97-AF65-F5344CB8AC3E}">
+        <p14:creationId xmlns:p14="http://schemas.microsoft.com/office/powerpoint/2010/main" val="2466100826"/>
+      </p:ext>
+    </p:extLst>
+  </p:cSld>
+  <p:clrMapOvr>
+    <a:masterClrMapping/>
+  </p:clrMapOvr>
+</p:sld>
+</file>
+
+<file path=ppt/slides/slide8.xml><?xml version="1.0" encoding="utf-8"?>
+<p:sld xmlns:a="http://schemas.openxmlformats.org/drawingml/2006/main" xmlns:r="http://schemas.openxmlformats.org/officeDocument/2006/relationships" xmlns:p="http://schemas.openxmlformats.org/presentationml/2006/main">
+  <p:cSld>
+    <p:spTree>
+      <p:nvGrpSpPr>
+        <p:cNvPr id="1" name=""/>
+        <p:cNvGrpSpPr/>
+        <p:nvPr/>
+      </p:nvGrpSpPr>
+      <p:grpSpPr>
+        <a:xfrm>
+          <a:off x="0" y="0"/>
+          <a:ext cx="0" cy="0"/>
+          <a:chOff x="0" y="0"/>
+          <a:chExt cx="0" cy="0"/>
+        </a:xfrm>
+      </p:grpSpPr>
     </p:spTree>
     <p:extLst>
       <p:ext uri="{BB962C8B-B14F-4D97-AF65-F5344CB8AC3E}">

</xml_diff>